<commit_message>
updated presentation and pics and stuff
</commit_message>
<xml_diff>
--- a/Documents/Presentations/Final Presentation v2.pptx
+++ b/Documents/Presentations/Final Presentation v2.pptx
@@ -854,15 +854,7 @@
                   <a:schemeClr val="bg1"/>
                 </a:solidFill>
               </a:rPr>
-              <a:t>This </a:t>
-            </a:r>
-            <a:r>
-              <a:rPr lang="en-AU" dirty="0" smtClean="0">
-                <a:solidFill>
-                  <a:schemeClr val="bg1"/>
-                </a:solidFill>
-              </a:rPr>
-              <a:t>project is essentially an evaluation step towards a more concrete implementation</a:t>
+              <a:t>This project is essentially an evaluation step towards a more concrete implementation</a:t>
             </a:r>
           </a:p>
           <a:p>
@@ -1046,6 +1038,116 @@
     <p:extLst>
       <p:ext uri="{BB962C8B-B14F-4D97-AF65-F5344CB8AC3E}">
         <p14:creationId xmlns:p14="http://schemas.microsoft.com/office/powerpoint/2010/main" val="3227439634"/>
+      </p:ext>
+    </p:extLst>
+  </p:cSld>
+  <p:clrMapOvr>
+    <a:masterClrMapping/>
+  </p:clrMapOvr>
+</p:notes>
+</file>
+
+<file path=ppt/notesSlides/notesSlide4.xml><?xml version="1.0" encoding="utf-8"?>
+<p:notes xmlns:a="http://schemas.openxmlformats.org/drawingml/2006/main" xmlns:r="http://schemas.openxmlformats.org/officeDocument/2006/relationships" xmlns:p="http://schemas.openxmlformats.org/presentationml/2006/main">
+  <p:cSld>
+    <p:spTree>
+      <p:nvGrpSpPr>
+        <p:cNvPr id="1" name=""/>
+        <p:cNvGrpSpPr/>
+        <p:nvPr/>
+      </p:nvGrpSpPr>
+      <p:grpSpPr>
+        <a:xfrm>
+          <a:off x="0" y="0"/>
+          <a:ext cx="0" cy="0"/>
+          <a:chOff x="0" y="0"/>
+          <a:chExt cx="0" cy="0"/>
+        </a:xfrm>
+      </p:grpSpPr>
+      <p:sp>
+        <p:nvSpPr>
+          <p:cNvPr id="2" name="Slide Image Placeholder 1"/>
+          <p:cNvSpPr>
+            <a:spLocks noGrp="1" noRot="1" noChangeAspect="1"/>
+          </p:cNvSpPr>
+          <p:nvPr>
+            <p:ph type="sldImg"/>
+          </p:nvPr>
+        </p:nvSpPr>
+        <p:spPr/>
+      </p:sp>
+      <p:sp>
+        <p:nvSpPr>
+          <p:cNvPr id="3" name="Notes Placeholder 2"/>
+          <p:cNvSpPr>
+            <a:spLocks noGrp="1"/>
+          </p:cNvSpPr>
+          <p:nvPr>
+            <p:ph type="body" idx="1"/>
+          </p:nvPr>
+        </p:nvSpPr>
+        <p:spPr/>
+        <p:txBody>
+          <a:bodyPr/>
+          <a:lstStyle/>
+          <a:p>
+            <a:pPr marL="0" indent="0">
+              <a:buNone/>
+            </a:pPr>
+            <a:r>
+              <a:rPr lang="en-AU" dirty="0" smtClean="0">
+                <a:solidFill>
+                  <a:schemeClr val="bg1"/>
+                </a:solidFill>
+              </a:rPr>
+              <a:t>Work breakdown </a:t>
+            </a:r>
+          </a:p>
+          <a:p>
+            <a:pPr marL="0" indent="0">
+              <a:buNone/>
+            </a:pPr>
+            <a:r>
+              <a:rPr lang="en-AU" dirty="0" smtClean="0">
+                <a:solidFill>
+                  <a:schemeClr val="bg1"/>
+                </a:solidFill>
+              </a:rPr>
+              <a:t>Work assignment</a:t>
+            </a:r>
+          </a:p>
+          <a:p>
+            <a:endParaRPr lang="en-AU" dirty="0"/>
+          </a:p>
+        </p:txBody>
+      </p:sp>
+      <p:sp>
+        <p:nvSpPr>
+          <p:cNvPr id="4" name="Slide Number Placeholder 3"/>
+          <p:cNvSpPr>
+            <a:spLocks noGrp="1"/>
+          </p:cNvSpPr>
+          <p:nvPr>
+            <p:ph type="sldNum" sz="quarter" idx="10"/>
+          </p:nvPr>
+        </p:nvSpPr>
+        <p:spPr/>
+        <p:txBody>
+          <a:bodyPr/>
+          <a:lstStyle/>
+          <a:p>
+            <a:fld id="{669EF7E7-637B-4D4D-B395-2767E515EB08}" type="slidenum">
+              <a:rPr lang="en-AU" smtClean="0"/>
+              <a:t>8</a:t>
+            </a:fld>
+            <a:endParaRPr lang="en-AU"/>
+          </a:p>
+        </p:txBody>
+      </p:sp>
+    </p:spTree>
+    <p:extLst>
+      <p:ext uri="{BB962C8B-B14F-4D97-AF65-F5344CB8AC3E}">
+        <p14:creationId xmlns:p14="http://schemas.microsoft.com/office/powerpoint/2010/main" val="3372127803"/>
       </p:ext>
     </p:extLst>
   </p:cSld>
@@ -4117,12 +4219,12 @@
         <p:spPr>
           <a:xfrm>
             <a:off x="107504" y="2996952"/>
-            <a:ext cx="8928992" cy="2641848"/>
+            <a:ext cx="8928992" cy="2520280"/>
           </a:xfrm>
         </p:spPr>
         <p:txBody>
           <a:bodyPr>
-            <a:normAutofit/>
+            <a:normAutofit lnSpcReduction="10000"/>
           </a:bodyPr>
           <a:lstStyle/>
           <a:p>
@@ -4149,8 +4251,31 @@
                   <a:schemeClr val="bg1"/>
                 </a:solidFill>
               </a:rPr>
-              <a:t>An ICT313 Games Technology Project</a:t>
-            </a:r>
+              <a:t>An ICT313 Games Technology </a:t>
+            </a:r>
+            <a:r>
+              <a:rPr lang="en-AU" sz="2000" dirty="0" smtClean="0">
+                <a:solidFill>
+                  <a:schemeClr val="bg1"/>
+                </a:solidFill>
+              </a:rPr>
+              <a:t>Project</a:t>
+            </a:r>
+          </a:p>
+          <a:p>
+            <a:r>
+              <a:rPr lang="en-AU" sz="2000" dirty="0" smtClean="0">
+                <a:solidFill>
+                  <a:schemeClr val="bg1"/>
+                </a:solidFill>
+              </a:rPr>
+              <a:t>Murdoch University</a:t>
+            </a:r>
+            <a:endParaRPr lang="en-AU" sz="2000" dirty="0" smtClean="0">
+              <a:solidFill>
+                <a:schemeClr val="bg1"/>
+              </a:solidFill>
+            </a:endParaRPr>
           </a:p>
           <a:p>
             <a:endParaRPr lang="en-AU" sz="2000" dirty="0" smtClean="0">
@@ -4296,7 +4421,7 @@
 </file>
 
 <file path=ppt/slides/slide10.xml><?xml version="1.0" encoding="utf-8"?>
-<p:sld xmlns:a="http://schemas.openxmlformats.org/drawingml/2006/main" xmlns:r="http://schemas.openxmlformats.org/officeDocument/2006/relationships" xmlns:p="http://schemas.openxmlformats.org/presentationml/2006/main">
+<p:sld xmlns:a="http://schemas.openxmlformats.org/drawingml/2006/main" xmlns:r="http://schemas.openxmlformats.org/officeDocument/2006/relationships" xmlns:p="http://schemas.openxmlformats.org/presentationml/2006/main" show="0">
   <p:cSld>
     <p:spTree>
       <p:nvGrpSpPr>
@@ -4461,6 +4586,14 @@
   <p:clrMapOvr>
     <a:masterClrMapping/>
   </p:clrMapOvr>
+  <mc:AlternateContent xmlns:mc="http://schemas.openxmlformats.org/markup-compatibility/2006">
+    <mc:Choice xmlns:p14="http://schemas.microsoft.com/office/powerpoint/2010/main" Requires="p14">
+      <p:transition spd="slow" p14:dur="2000"/>
+    </mc:Choice>
+    <mc:Fallback>
+      <p:transition spd="slow"/>
+    </mc:Fallback>
+  </mc:AlternateContent>
   <p:timing>
     <p:tnLst>
       <p:par>
@@ -4539,7 +4672,23 @@
                   <a:schemeClr val="bg1"/>
                 </a:solidFill>
               </a:rPr>
-              <a:t> – “Object Avoidance” exercise</a:t>
+              <a:t> – “Object Avoidance” </a:t>
+            </a:r>
+            <a:r>
+              <a:rPr lang="en-AU" dirty="0" smtClean="0">
+                <a:solidFill>
+                  <a:schemeClr val="bg1"/>
+                </a:solidFill>
+              </a:rPr>
+              <a:t>task</a:t>
+            </a:r>
+            <a:r>
+              <a:rPr lang="en-AU" dirty="0">
+                <a:solidFill>
+                  <a:schemeClr val="bg1"/>
+                </a:solidFill>
+              </a:rPr>
+              <a:t/>
             </a:r>
             <a:br>
               <a:rPr lang="en-AU" dirty="0">
@@ -4580,7 +4729,7 @@
               <a:buNone/>
             </a:pPr>
             <a:r>
-              <a:rPr lang="en-AU" dirty="0" smtClean="0">
+              <a:rPr lang="en-AU" sz="2000" dirty="0" smtClean="0">
                 <a:solidFill>
                   <a:schemeClr val="bg1"/>
                 </a:solidFill>
@@ -4592,7 +4741,7 @@
             <a:pPr marL="0" indent="0">
               <a:buNone/>
             </a:pPr>
-            <a:endParaRPr lang="en-AU" dirty="0" smtClean="0">
+            <a:endParaRPr lang="en-AU" sz="2000" dirty="0" smtClean="0">
               <a:solidFill>
                 <a:schemeClr val="bg1"/>
               </a:solidFill>
@@ -4603,7 +4752,7 @@
               <a:buNone/>
             </a:pPr>
             <a:r>
-              <a:rPr lang="en-AU" dirty="0" err="1" smtClean="0">
+              <a:rPr lang="en-AU" sz="2000" dirty="0" err="1" smtClean="0">
                 <a:solidFill>
                   <a:schemeClr val="bg1"/>
                 </a:solidFill>
@@ -4611,7 +4760,7 @@
               <a:t>Kinect</a:t>
             </a:r>
             <a:r>
-              <a:rPr lang="en-AU" dirty="0" smtClean="0">
+              <a:rPr lang="en-AU" sz="2000" dirty="0" smtClean="0">
                 <a:solidFill>
                   <a:schemeClr val="bg1"/>
                 </a:solidFill>
@@ -4625,7 +4774,7 @@
               <a:buChar char="§"/>
             </a:pPr>
             <a:r>
-              <a:rPr lang="en-AU" dirty="0" smtClean="0">
+              <a:rPr lang="en-AU" sz="2000" dirty="0" smtClean="0">
                 <a:solidFill>
                   <a:schemeClr val="bg1"/>
                 </a:solidFill>
@@ -4639,7 +4788,7 @@
               <a:buChar char="§"/>
             </a:pPr>
             <a:r>
-              <a:rPr lang="en-AU" dirty="0" smtClean="0">
+              <a:rPr lang="en-AU" sz="2000" dirty="0" smtClean="0">
                 <a:solidFill>
                   <a:schemeClr val="bg1"/>
                 </a:solidFill>
@@ -4714,7 +4863,7 @@
         </p:spPr>
         <p:txBody>
           <a:bodyPr>
-            <a:normAutofit fontScale="90000"/>
+            <a:normAutofit/>
           </a:bodyPr>
           <a:lstStyle/>
           <a:p>
@@ -4747,7 +4896,15 @@
                   <a:schemeClr val="bg1"/>
                 </a:solidFill>
               </a:rPr>
-              <a:t>Razer Hydra – “Object Manipulation” exercise</a:t>
+              <a:t>Razer Hydra – “Object Manipulation” </a:t>
+            </a:r>
+            <a:r>
+              <a:rPr lang="en-AU" sz="3600" dirty="0">
+                <a:solidFill>
+                  <a:schemeClr val="bg1"/>
+                </a:solidFill>
+              </a:rPr>
+              <a:t>task</a:t>
             </a:r>
             <a:r>
               <a:rPr lang="en-AU" dirty="0">
@@ -4780,14 +4937,16 @@
         </p:nvSpPr>
         <p:spPr/>
         <p:txBody>
-          <a:bodyPr/>
+          <a:bodyPr>
+            <a:normAutofit/>
+          </a:bodyPr>
           <a:lstStyle/>
           <a:p>
             <a:pPr marL="0" indent="0">
               <a:buNone/>
             </a:pPr>
             <a:r>
-              <a:rPr lang="en-AU" dirty="0" smtClean="0">
+              <a:rPr lang="en-AU" sz="2000" dirty="0" smtClean="0">
                 <a:solidFill>
                   <a:schemeClr val="bg1"/>
                 </a:solidFill>
@@ -4799,7 +4958,7 @@
             <a:pPr marL="0" indent="0">
               <a:buNone/>
             </a:pPr>
-            <a:endParaRPr lang="en-AU" dirty="0" smtClean="0">
+            <a:endParaRPr lang="en-AU" sz="2000" dirty="0" smtClean="0">
               <a:solidFill>
                 <a:schemeClr val="bg1"/>
               </a:solidFill>
@@ -4810,14 +4969,14 @@
               <a:buNone/>
             </a:pPr>
             <a:r>
-              <a:rPr lang="en-AU" dirty="0" smtClean="0">
+              <a:rPr lang="en-AU" sz="2000" dirty="0" smtClean="0">
                 <a:solidFill>
                   <a:schemeClr val="bg1"/>
                 </a:solidFill>
               </a:rPr>
               <a:t>Razer Hydra actions</a:t>
             </a:r>
-            <a:endParaRPr lang="en-AU" dirty="0">
+            <a:endParaRPr lang="en-AU" sz="2000" dirty="0">
               <a:solidFill>
                 <a:schemeClr val="bg1"/>
               </a:solidFill>
@@ -4829,7 +4988,7 @@
               <a:buChar char="§"/>
             </a:pPr>
             <a:r>
-              <a:rPr lang="en-AU" dirty="0">
+              <a:rPr lang="en-AU" sz="2000" dirty="0">
                 <a:solidFill>
                   <a:schemeClr val="bg1"/>
                 </a:solidFill>
@@ -4843,7 +5002,7 @@
               <a:buChar char="§"/>
             </a:pPr>
             <a:r>
-              <a:rPr lang="en-AU" dirty="0">
+              <a:rPr lang="en-AU" sz="2000" dirty="0">
                 <a:solidFill>
                   <a:schemeClr val="bg1"/>
                 </a:solidFill>
@@ -4851,14 +5010,14 @@
               <a:t>Heightened </a:t>
             </a:r>
             <a:r>
-              <a:rPr lang="en-AU" dirty="0" smtClean="0">
+              <a:rPr lang="en-AU" sz="2000" dirty="0" smtClean="0">
                 <a:solidFill>
                   <a:schemeClr val="bg1"/>
                 </a:solidFill>
               </a:rPr>
               <a:t>sensitivity</a:t>
             </a:r>
-            <a:endParaRPr lang="en-AU" dirty="0">
+            <a:endParaRPr lang="en-AU" sz="2000" dirty="0">
               <a:solidFill>
                 <a:schemeClr val="bg1"/>
               </a:solidFill>
@@ -4970,7 +5129,23 @@
                   <a:schemeClr val="bg1"/>
                 </a:solidFill>
               </a:rPr>
-              <a:t>Way Finding” exercise</a:t>
+              <a:t>Way Finding” </a:t>
+            </a:r>
+            <a:r>
+              <a:rPr lang="en-AU" dirty="0">
+                <a:solidFill>
+                  <a:schemeClr val="bg1"/>
+                </a:solidFill>
+              </a:rPr>
+              <a:t>task</a:t>
+            </a:r>
+            <a:r>
+              <a:rPr lang="en-AU" dirty="0">
+                <a:solidFill>
+                  <a:schemeClr val="bg1"/>
+                </a:solidFill>
+              </a:rPr>
+              <a:t/>
             </a:r>
             <a:br>
               <a:rPr lang="en-AU" dirty="0">
@@ -5002,7 +5177,7 @@
               <a:buNone/>
             </a:pPr>
             <a:r>
-              <a:rPr lang="en-AU" dirty="0" smtClean="0">
+              <a:rPr lang="en-AU" sz="2000" dirty="0" smtClean="0">
                 <a:solidFill>
                   <a:schemeClr val="bg1"/>
                 </a:solidFill>
@@ -5014,7 +5189,7 @@
             <a:pPr marL="0" indent="0">
               <a:buNone/>
             </a:pPr>
-            <a:endParaRPr lang="en-AU" dirty="0" smtClean="0">
+            <a:endParaRPr lang="en-AU" sz="2000" dirty="0" smtClean="0">
               <a:solidFill>
                 <a:schemeClr val="bg1"/>
               </a:solidFill>
@@ -5025,14 +5200,14 @@
               <a:buNone/>
             </a:pPr>
             <a:r>
-              <a:rPr lang="en-AU" dirty="0" smtClean="0">
+              <a:rPr lang="en-AU" sz="2000" dirty="0" smtClean="0">
                 <a:solidFill>
                   <a:schemeClr val="bg1"/>
                 </a:solidFill>
               </a:rPr>
               <a:t>Leap Motion actions</a:t>
             </a:r>
-            <a:endParaRPr lang="en-AU" dirty="0">
+            <a:endParaRPr lang="en-AU" sz="2000" dirty="0">
               <a:solidFill>
                 <a:schemeClr val="bg1"/>
               </a:solidFill>
@@ -5044,7 +5219,7 @@
               <a:buChar char="§"/>
             </a:pPr>
             <a:r>
-              <a:rPr lang="en-AU" dirty="0" smtClean="0">
+              <a:rPr lang="en-AU" sz="2000" dirty="0" smtClean="0">
                 <a:solidFill>
                   <a:schemeClr val="bg1"/>
                 </a:solidFill>
@@ -5052,7 +5227,7 @@
               <a:t>Able </a:t>
             </a:r>
             <a:r>
-              <a:rPr lang="en-AU" dirty="0">
+              <a:rPr lang="en-AU" sz="2000" dirty="0">
                 <a:solidFill>
                   <a:schemeClr val="bg1"/>
                 </a:solidFill>
@@ -5066,7 +5241,7 @@
               <a:buChar char="§"/>
             </a:pPr>
             <a:r>
-              <a:rPr lang="en-AU" dirty="0">
+              <a:rPr lang="en-AU" sz="2000" dirty="0">
                 <a:solidFill>
                   <a:schemeClr val="bg1"/>
                 </a:solidFill>
@@ -5074,7 +5249,7 @@
               <a:t>Heightened </a:t>
             </a:r>
             <a:r>
-              <a:rPr lang="en-AU" dirty="0" smtClean="0">
+              <a:rPr lang="en-AU" sz="2000" dirty="0" smtClean="0">
                 <a:solidFill>
                   <a:schemeClr val="bg1"/>
                 </a:solidFill>
@@ -5088,7 +5263,7 @@
               <a:buChar char="§"/>
             </a:pPr>
             <a:r>
-              <a:rPr lang="en-AU" dirty="0">
+              <a:rPr lang="en-AU" sz="2000" dirty="0">
                 <a:solidFill>
                   <a:schemeClr val="bg1"/>
                 </a:solidFill>
@@ -5096,7 +5271,7 @@
               <a:t>Tracks all 10 fingers up to 1/100</a:t>
             </a:r>
             <a:r>
-              <a:rPr lang="en-AU" baseline="30000" dirty="0">
+              <a:rPr lang="en-AU" sz="2000" baseline="30000" dirty="0">
                 <a:solidFill>
                   <a:schemeClr val="bg1"/>
                 </a:solidFill>
@@ -5104,7 +5279,7 @@
               <a:t>th</a:t>
             </a:r>
             <a:r>
-              <a:rPr lang="en-AU" dirty="0">
+              <a:rPr lang="en-AU" sz="2000" dirty="0">
                 <a:solidFill>
                   <a:schemeClr val="bg1"/>
                 </a:solidFill>
@@ -5112,14 +5287,14 @@
               <a:t> of a </a:t>
             </a:r>
             <a:r>
-              <a:rPr lang="en-AU" dirty="0" err="1">
+              <a:rPr lang="en-AU" sz="2000" dirty="0" err="1">
                 <a:solidFill>
                   <a:schemeClr val="bg1"/>
                 </a:solidFill>
               </a:rPr>
               <a:t>millimeter</a:t>
             </a:r>
-            <a:endParaRPr lang="en-AU" dirty="0">
+            <a:endParaRPr lang="en-AU" sz="2000" dirty="0">
               <a:solidFill>
                 <a:schemeClr val="bg1"/>
               </a:solidFill>
@@ -5131,14 +5306,14 @@
               <a:buChar char="§"/>
             </a:pPr>
             <a:r>
-              <a:rPr lang="en-AU" dirty="0" smtClean="0">
+              <a:rPr lang="en-AU" sz="2000" dirty="0" smtClean="0">
                 <a:solidFill>
                   <a:schemeClr val="bg1"/>
                 </a:solidFill>
               </a:rPr>
               <a:t>Beta product</a:t>
             </a:r>
-            <a:endParaRPr lang="en-AU" dirty="0">
+            <a:endParaRPr lang="en-AU" sz="2000" dirty="0">
               <a:solidFill>
                 <a:schemeClr val="bg1"/>
               </a:solidFill>
@@ -5237,12 +5412,12 @@
         <p:spPr>
           <a:xfrm>
             <a:off x="457200" y="1412776"/>
-            <a:ext cx="8229600" cy="5256584"/>
+            <a:ext cx="7067128" cy="5256584"/>
           </a:xfrm>
         </p:spPr>
         <p:txBody>
           <a:bodyPr>
-            <a:normAutofit fontScale="92500" lnSpcReduction="20000"/>
+            <a:normAutofit/>
           </a:bodyPr>
           <a:lstStyle/>
           <a:p>
@@ -5250,7 +5425,7 @@
               <a:buNone/>
             </a:pPr>
             <a:r>
-              <a:rPr lang="en-AU" dirty="0" smtClean="0">
+              <a:rPr lang="en-AU" sz="2000" dirty="0" smtClean="0">
                 <a:solidFill>
                   <a:schemeClr val="bg1"/>
                 </a:solidFill>
@@ -5264,7 +5439,7 @@
               <a:buChar char="ü"/>
             </a:pPr>
             <a:r>
-              <a:rPr lang="en-AU" dirty="0" smtClean="0">
+              <a:rPr lang="en-AU" sz="2000" dirty="0" smtClean="0">
                 <a:solidFill>
                   <a:schemeClr val="bg1"/>
                 </a:solidFill>
@@ -5278,56 +5453,22 @@
               <a:buChar char="ü"/>
             </a:pPr>
             <a:r>
-              <a:rPr lang="en-AU" dirty="0" smtClean="0">
-                <a:solidFill>
-                  <a:schemeClr val="bg1"/>
-                </a:solidFill>
-              </a:rPr>
-              <a:t> 3 different exercises</a:t>
-            </a:r>
-          </a:p>
-          <a:p>
-            <a:pPr lvl="1">
-              <a:buFont typeface="Wingdings" panose="05000000000000000000" pitchFamily="2" charset="2"/>
-              <a:buChar char="ü"/>
-            </a:pPr>
-            <a:r>
-              <a:rPr lang="en-AU" dirty="0" smtClean="0">
-                <a:solidFill>
-                  <a:schemeClr val="bg1"/>
-                </a:solidFill>
-              </a:rPr>
-              <a:t> Devices</a:t>
-            </a:r>
-          </a:p>
-          <a:p>
-            <a:pPr lvl="1">
-              <a:buFont typeface="Wingdings" panose="05000000000000000000" pitchFamily="2" charset="2"/>
-              <a:buChar char="ü"/>
-            </a:pPr>
-            <a:r>
-              <a:rPr lang="en-AU" dirty="0" smtClean="0">
-                <a:solidFill>
-                  <a:schemeClr val="bg1"/>
-                </a:solidFill>
-              </a:rPr>
-              <a:t> Sensitivity adjustor</a:t>
-            </a:r>
-          </a:p>
-          <a:p>
-            <a:pPr lvl="1">
-              <a:buFont typeface="Wingdings" panose="05000000000000000000" pitchFamily="2" charset="2"/>
-              <a:buChar char="ü"/>
-            </a:pPr>
-            <a:r>
-              <a:rPr lang="en-AU" dirty="0" smtClean="0">
-                <a:solidFill>
-                  <a:schemeClr val="bg1"/>
-                </a:solidFill>
-              </a:rPr>
-              <a:t> Profiling</a:t>
-            </a:r>
-            <a:endParaRPr lang="en-AU" dirty="0">
+              <a:rPr lang="en-AU" sz="2000" dirty="0" smtClean="0">
+                <a:solidFill>
+                  <a:schemeClr val="bg1"/>
+                </a:solidFill>
+              </a:rPr>
+              <a:t> 3 different </a:t>
+            </a:r>
+            <a:r>
+              <a:rPr lang="en-AU" sz="2000" dirty="0" smtClean="0">
+                <a:solidFill>
+                  <a:schemeClr val="bg1"/>
+                </a:solidFill>
+              </a:rPr>
+              <a:t>tasks</a:t>
+            </a:r>
+            <a:endParaRPr lang="en-AU" sz="2000" dirty="0" smtClean="0">
               <a:solidFill>
                 <a:schemeClr val="bg1"/>
               </a:solidFill>
@@ -5339,7 +5480,67 @@
               <a:buChar char="ü"/>
             </a:pPr>
             <a:r>
-              <a:rPr lang="en-AU" dirty="0" smtClean="0">
+              <a:rPr lang="en-AU" sz="2000" dirty="0" smtClean="0">
+                <a:solidFill>
+                  <a:schemeClr val="bg1"/>
+                </a:solidFill>
+              </a:rPr>
+              <a:t> </a:t>
+            </a:r>
+            <a:r>
+              <a:rPr lang="en-AU" sz="2000" dirty="0" smtClean="0">
+                <a:solidFill>
+                  <a:schemeClr val="bg1"/>
+                </a:solidFill>
+              </a:rPr>
+              <a:t>NUIs Devices</a:t>
+            </a:r>
+            <a:endParaRPr lang="en-AU" sz="2000" dirty="0" smtClean="0">
+              <a:solidFill>
+                <a:schemeClr val="bg1"/>
+              </a:solidFill>
+            </a:endParaRPr>
+          </a:p>
+          <a:p>
+            <a:pPr lvl="1">
+              <a:buFont typeface="Wingdings" panose="05000000000000000000" pitchFamily="2" charset="2"/>
+              <a:buChar char="ü"/>
+            </a:pPr>
+            <a:r>
+              <a:rPr lang="en-AU" sz="2000" dirty="0" smtClean="0">
+                <a:solidFill>
+                  <a:schemeClr val="bg1"/>
+                </a:solidFill>
+              </a:rPr>
+              <a:t> Sensitivity adjustor</a:t>
+            </a:r>
+          </a:p>
+          <a:p>
+            <a:pPr lvl="1">
+              <a:buFont typeface="Wingdings" panose="05000000000000000000" pitchFamily="2" charset="2"/>
+              <a:buChar char="ü"/>
+            </a:pPr>
+            <a:r>
+              <a:rPr lang="en-AU" sz="2000" dirty="0" smtClean="0">
+                <a:solidFill>
+                  <a:schemeClr val="bg1"/>
+                </a:solidFill>
+              </a:rPr>
+              <a:t> Profiling</a:t>
+            </a:r>
+            <a:endParaRPr lang="en-AU" sz="2000" dirty="0">
+              <a:solidFill>
+                <a:schemeClr val="bg1"/>
+              </a:solidFill>
+            </a:endParaRPr>
+          </a:p>
+          <a:p>
+            <a:pPr lvl="1">
+              <a:buFont typeface="Wingdings" panose="05000000000000000000" pitchFamily="2" charset="2"/>
+              <a:buChar char="ü"/>
+            </a:pPr>
+            <a:r>
+              <a:rPr lang="en-AU" sz="2000" dirty="0" smtClean="0">
                 <a:solidFill>
                   <a:schemeClr val="bg1"/>
                 </a:solidFill>
@@ -5352,20 +5553,33 @@
               <a:buNone/>
             </a:pPr>
             <a:r>
-              <a:rPr lang="en-AU" dirty="0" smtClean="0">
-                <a:solidFill>
-                  <a:schemeClr val="bg1"/>
-                </a:solidFill>
-              </a:rPr>
-              <a:t>Playable by non-IT savvy people</a:t>
-            </a:r>
+              <a:rPr lang="en-AU" sz="2000" dirty="0" smtClean="0">
+                <a:solidFill>
+                  <a:schemeClr val="bg1"/>
+                </a:solidFill>
+              </a:rPr>
+              <a:t>Playable by </a:t>
+            </a:r>
+            <a:r>
+              <a:rPr lang="en-AU" sz="2000" dirty="0" smtClean="0">
+                <a:solidFill>
+                  <a:schemeClr val="bg1"/>
+                </a:solidFill>
+              </a:rPr>
+              <a:t>anyone</a:t>
+            </a:r>
+            <a:endParaRPr lang="en-AU" sz="2000" dirty="0" smtClean="0">
+              <a:solidFill>
+                <a:schemeClr val="bg1"/>
+              </a:solidFill>
+            </a:endParaRPr>
           </a:p>
           <a:p>
             <a:pPr marL="0" indent="0">
               <a:buNone/>
             </a:pPr>
             <a:r>
-              <a:rPr lang="en-AU" dirty="0" smtClean="0">
+              <a:rPr lang="en-AU" sz="2000" dirty="0" smtClean="0">
                 <a:solidFill>
                   <a:schemeClr val="bg1"/>
                 </a:solidFill>
@@ -5378,100 +5592,101 @@
               <a:buNone/>
             </a:pPr>
             <a:r>
-              <a:rPr lang="en-AU" dirty="0" smtClean="0">
-                <a:solidFill>
-                  <a:schemeClr val="bg1"/>
-                </a:solidFill>
-              </a:rPr>
-              <a:t>Extendable</a:t>
-            </a:r>
+              <a:rPr lang="en-AU" sz="2000" dirty="0" smtClean="0">
+                <a:solidFill>
+                  <a:schemeClr val="bg1"/>
+                </a:solidFill>
+              </a:rPr>
+              <a:t>Extensible</a:t>
+            </a:r>
+            <a:endParaRPr lang="en-AU" sz="2000" dirty="0" smtClean="0">
+              <a:solidFill>
+                <a:schemeClr val="bg1"/>
+              </a:solidFill>
+            </a:endParaRPr>
           </a:p>
           <a:p>
             <a:pPr marL="0" indent="0">
               <a:buNone/>
             </a:pPr>
             <a:r>
-              <a:rPr lang="en-AU" dirty="0" smtClean="0">
-                <a:solidFill>
-                  <a:schemeClr val="bg1"/>
-                </a:solidFill>
-              </a:rPr>
-              <a:t>The project is now in a position to be extended for deployment into practical use</a:t>
-            </a:r>
-          </a:p>
-        </p:txBody>
-      </p:sp>
-      <p:sp>
-        <p:nvSpPr>
-          <p:cNvPr id="5" name="Rectangle 4"/>
-          <p:cNvSpPr/>
+              <a:rPr lang="en-AU" sz="2000" dirty="0" smtClean="0">
+                <a:solidFill>
+                  <a:schemeClr val="bg1"/>
+                </a:solidFill>
+              </a:rPr>
+              <a:t>The project is now in a position </a:t>
+            </a:r>
+            <a:endParaRPr lang="en-AU" sz="2000" dirty="0" smtClean="0">
+              <a:solidFill>
+                <a:schemeClr val="bg1"/>
+              </a:solidFill>
+            </a:endParaRPr>
+          </a:p>
+          <a:p>
+            <a:pPr marL="0" indent="0">
+              <a:buNone/>
+            </a:pPr>
+            <a:r>
+              <a:rPr lang="en-AU" sz="2000" dirty="0" smtClean="0">
+                <a:solidFill>
+                  <a:schemeClr val="bg1"/>
+                </a:solidFill>
+              </a:rPr>
+              <a:t>to </a:t>
+            </a:r>
+            <a:r>
+              <a:rPr lang="en-AU" sz="2000" dirty="0" smtClean="0">
+                <a:solidFill>
+                  <a:schemeClr val="bg1"/>
+                </a:solidFill>
+              </a:rPr>
+              <a:t>be extended for deployment into practical use</a:t>
+            </a:r>
+          </a:p>
+        </p:txBody>
+      </p:sp>
+      <p:pic>
+        <p:nvPicPr>
+          <p:cNvPr id="2050" name="Picture 2" descr="C:\Users\Hannah\Desktop\ICT313 Project\setup\Levels\Tempest Neuromend\Assets\Tempest\Resources\TitleProxy01.jpg"/>
+          <p:cNvPicPr>
+            <a:picLocks noChangeAspect="1" noChangeArrowheads="1"/>
+          </p:cNvPicPr>
           <p:nvPr/>
-        </p:nvSpPr>
-        <p:spPr>
+        </p:nvPicPr>
+        <p:blipFill>
+          <a:blip r:embed="rId2" cstate="print">
+            <a:extLst>
+              <a:ext uri="{28A0092B-C50C-407E-A947-70E740481C1C}">
+                <a14:useLocalDpi xmlns:a14="http://schemas.microsoft.com/office/drawing/2010/main" val="0"/>
+              </a:ext>
+            </a:extLst>
+          </a:blip>
+          <a:srcRect/>
+          <a:stretch>
+            <a:fillRect/>
+          </a:stretch>
+        </p:blipFill>
+        <p:spPr bwMode="auto">
           <a:xfrm>
-            <a:off x="4932040" y="1772816"/>
-            <a:ext cx="3456384" cy="2520280"/>
-          </a:xfrm>
-          <a:prstGeom prst="rect">
-            <a:avLst/>
-          </a:prstGeom>
-        </p:spPr>
-        <p:style>
-          <a:lnRef idx="2">
-            <a:schemeClr val="accent1">
-              <a:shade val="50000"/>
-            </a:schemeClr>
-          </a:lnRef>
-          <a:fillRef idx="1">
-            <a:schemeClr val="accent1"/>
-          </a:fillRef>
-          <a:effectRef idx="0">
-            <a:schemeClr val="accent1"/>
-          </a:effectRef>
-          <a:fontRef idx="minor">
-            <a:schemeClr val="lt1"/>
-          </a:fontRef>
-        </p:style>
-        <p:txBody>
-          <a:bodyPr rtlCol="0" anchor="ctr"/>
-          <a:lstStyle/>
-          <a:p>
-            <a:pPr algn="ctr"/>
-            <a:endParaRPr lang="en-AU"/>
-          </a:p>
-        </p:txBody>
-      </p:sp>
-      <p:sp>
-        <p:nvSpPr>
-          <p:cNvPr id="4" name="TextBox 3"/>
-          <p:cNvSpPr txBox="1"/>
-          <p:nvPr/>
-        </p:nvSpPr>
-        <p:spPr>
-          <a:xfrm>
-            <a:off x="5112060" y="2780928"/>
-            <a:ext cx="3096344" cy="369332"/>
+            <a:off x="3851920" y="1196752"/>
+            <a:ext cx="5048375" cy="4221907"/>
           </a:xfrm>
           <a:prstGeom prst="rect">
             <a:avLst/>
           </a:prstGeom>
           <a:noFill/>
+          <a:extLst>
+            <a:ext uri="{909E8E84-426E-40DD-AFC4-6F175D3DCCD1}">
+              <a14:hiddenFill xmlns:a14="http://schemas.microsoft.com/office/drawing/2010/main">
+                <a:solidFill>
+                  <a:srgbClr val="FFFFFF"/>
+                </a:solidFill>
+              </a14:hiddenFill>
+            </a:ext>
+          </a:extLst>
         </p:spPr>
-        <p:txBody>
-          <a:bodyPr wrap="square" rtlCol="0">
-            <a:spAutoFit/>
-          </a:bodyPr>
-          <a:lstStyle/>
-          <a:p>
-            <a:pPr algn="ctr"/>
-            <a:r>
-              <a:rPr lang="en-AU" dirty="0" smtClean="0"/>
-              <a:t>PICTURE OF MAIN MENU</a:t>
-            </a:r>
-            <a:endParaRPr lang="en-AU" dirty="0"/>
-          </a:p>
-        </p:txBody>
-      </p:sp>
+      </p:pic>
     </p:spTree>
     <p:extLst>
       <p:ext uri="{BB962C8B-B14F-4D97-AF65-F5344CB8AC3E}">
@@ -5552,14 +5767,16 @@
         </p:nvSpPr>
         <p:spPr/>
         <p:txBody>
-          <a:bodyPr/>
+          <a:bodyPr>
+            <a:normAutofit/>
+          </a:bodyPr>
           <a:lstStyle/>
           <a:p>
             <a:pPr marL="0" indent="0">
               <a:buNone/>
             </a:pPr>
             <a:r>
-              <a:rPr lang="en-AU" dirty="0" smtClean="0">
+              <a:rPr lang="en-AU" sz="2000" dirty="0" smtClean="0">
                 <a:solidFill>
                   <a:schemeClr val="bg1"/>
                 </a:solidFill>
@@ -5573,20 +5790,25 @@
               <a:buChar char="§"/>
             </a:pPr>
             <a:r>
-              <a:rPr lang="en-AU" dirty="0" smtClean="0">
-                <a:solidFill>
-                  <a:schemeClr val="bg1"/>
-                </a:solidFill>
-              </a:rPr>
-              <a:t>Client is in the process of setting up testing</a:t>
-            </a:r>
+              <a:rPr lang="en-AU" sz="2000" dirty="0" smtClean="0">
+                <a:solidFill>
+                  <a:schemeClr val="bg1"/>
+                </a:solidFill>
+              </a:rPr>
+              <a:t>The system will be tested soon</a:t>
+            </a:r>
+            <a:endParaRPr lang="en-AU" sz="2000" dirty="0" smtClean="0">
+              <a:solidFill>
+                <a:schemeClr val="bg1"/>
+              </a:solidFill>
+            </a:endParaRPr>
           </a:p>
           <a:p>
             <a:pPr marL="0" indent="0">
               <a:buNone/>
             </a:pPr>
             <a:r>
-              <a:rPr lang="en-AU" dirty="0" smtClean="0">
+              <a:rPr lang="en-AU" sz="2000" dirty="0" smtClean="0">
                 <a:solidFill>
                   <a:schemeClr val="bg1"/>
                 </a:solidFill>
@@ -5600,7 +5822,7 @@
               <a:buChar char="§"/>
             </a:pPr>
             <a:r>
-              <a:rPr lang="en-AU" dirty="0" smtClean="0">
+              <a:rPr lang="en-AU" sz="2000" dirty="0" smtClean="0">
                 <a:solidFill>
                   <a:schemeClr val="bg1"/>
                 </a:solidFill>
@@ -5614,13 +5836,32 @@
               <a:buChar char="§"/>
             </a:pPr>
             <a:r>
-              <a:rPr lang="en-AU" dirty="0" smtClean="0">
+              <a:rPr lang="en-AU" sz="2000" dirty="0" smtClean="0">
                 <a:solidFill>
                   <a:schemeClr val="bg1"/>
                 </a:solidFill>
               </a:rPr>
               <a:t>EEG</a:t>
             </a:r>
+          </a:p>
+          <a:p>
+            <a:pPr lvl="2">
+              <a:buFont typeface="Wingdings" panose="05000000000000000000" pitchFamily="2" charset="2"/>
+              <a:buChar char="§"/>
+            </a:pPr>
+            <a:r>
+              <a:rPr lang="en-AU" sz="2000" dirty="0" smtClean="0">
+                <a:solidFill>
+                  <a:schemeClr val="bg1"/>
+                </a:solidFill>
+              </a:rPr>
+              <a:t>Records brain wave patterns</a:t>
+            </a:r>
+            <a:endParaRPr lang="en-AU" sz="2000" dirty="0" smtClean="0">
+              <a:solidFill>
+                <a:schemeClr val="bg1"/>
+              </a:solidFill>
+            </a:endParaRPr>
           </a:p>
           <a:p>
             <a:pPr lvl="1">
@@ -5628,7 +5869,7 @@
               <a:buChar char="§"/>
             </a:pPr>
             <a:r>
-              <a:rPr lang="en-AU" dirty="0" smtClean="0">
+              <a:rPr lang="en-AU" sz="2000" dirty="0" smtClean="0">
                 <a:solidFill>
                   <a:schemeClr val="bg1"/>
                 </a:solidFill>
@@ -5637,16 +5878,19 @@
             </a:r>
           </a:p>
           <a:p>
-            <a:pPr lvl="2"/>
-            <a:r>
-              <a:rPr lang="en-AU" dirty="0" smtClean="0">
+            <a:pPr lvl="2">
+              <a:buFont typeface="Wingdings" panose="05000000000000000000" pitchFamily="2" charset="2"/>
+              <a:buChar char="§"/>
+            </a:pPr>
+            <a:r>
+              <a:rPr lang="en-AU" sz="2000" dirty="0" smtClean="0">
                 <a:solidFill>
                   <a:schemeClr val="bg1"/>
                 </a:solidFill>
               </a:rPr>
               <a:t>Stress</a:t>
             </a:r>
-            <a:endParaRPr lang="en-AU" dirty="0">
+            <a:endParaRPr lang="en-AU" sz="2000" dirty="0">
               <a:solidFill>
                 <a:schemeClr val="bg1"/>
               </a:solidFill>
@@ -5734,13 +5978,13 @@
         </p:nvSpPr>
         <p:spPr>
           <a:xfrm>
-            <a:off x="323528" y="1484784"/>
-            <a:ext cx="8363272" cy="5184576"/>
+            <a:off x="539552" y="1556792"/>
+            <a:ext cx="8147248" cy="5112568"/>
           </a:xfrm>
         </p:spPr>
         <p:txBody>
           <a:bodyPr>
-            <a:normAutofit fontScale="77500" lnSpcReduction="20000"/>
+            <a:noAutofit/>
           </a:bodyPr>
           <a:lstStyle/>
           <a:p>
@@ -5748,7 +5992,7 @@
               <a:buNone/>
             </a:pPr>
             <a:r>
-              <a:rPr lang="en-AU" dirty="0" smtClean="0">
+              <a:rPr lang="en-AU" sz="2000" dirty="0" smtClean="0">
                 <a:solidFill>
                   <a:schemeClr val="bg1"/>
                 </a:solidFill>
@@ -5762,7 +6006,7 @@
               <a:buChar char="§"/>
             </a:pPr>
             <a:r>
-              <a:rPr lang="en-AU" dirty="0" smtClean="0">
+              <a:rPr lang="en-AU" sz="2000" dirty="0" smtClean="0">
                 <a:solidFill>
                   <a:schemeClr val="bg1"/>
                 </a:solidFill>
@@ -5776,56 +6020,33 @@
               <a:buChar char="§"/>
             </a:pPr>
             <a:r>
-              <a:rPr lang="en-AU" dirty="0" smtClean="0">
-                <a:solidFill>
-                  <a:schemeClr val="bg1"/>
-                </a:solidFill>
-              </a:rPr>
-              <a:t>Driver clashes</a:t>
-            </a:r>
-          </a:p>
-          <a:p>
-            <a:pPr lvl="1">
-              <a:buFont typeface="Wingdings" panose="05000000000000000000" pitchFamily="2" charset="2"/>
-              <a:buChar char="§"/>
-            </a:pPr>
-            <a:r>
-              <a:rPr lang="en-AU" dirty="0" smtClean="0">
-                <a:solidFill>
-                  <a:schemeClr val="bg1"/>
-                </a:solidFill>
-              </a:rPr>
-              <a:t>Versions/compatibility</a:t>
-            </a:r>
-          </a:p>
-          <a:p>
-            <a:pPr marL="457200" lvl="1" indent="0">
-              <a:buNone/>
-            </a:pPr>
-            <a:endParaRPr lang="en-AU" sz="1400" dirty="0" smtClean="0">
+              <a:rPr lang="en-AU" sz="2000" dirty="0" smtClean="0">
+                <a:solidFill>
+                  <a:schemeClr val="bg1"/>
+                </a:solidFill>
+              </a:rPr>
+              <a:t>Drivers clashing</a:t>
+            </a:r>
+            <a:endParaRPr lang="en-AU" sz="2000" dirty="0" smtClean="0">
               <a:solidFill>
                 <a:schemeClr val="bg1"/>
               </a:solidFill>
             </a:endParaRPr>
           </a:p>
           <a:p>
-            <a:pPr marL="0" indent="0">
-              <a:buNone/>
-            </a:pPr>
-            <a:r>
-              <a:rPr lang="en-AU" dirty="0" smtClean="0">
-                <a:solidFill>
-                  <a:schemeClr val="bg1"/>
-                </a:solidFill>
-              </a:rPr>
-              <a:t>Designing the exercises and the movements/gestures to meet requirements and but to also consider the devices and what they can do</a:t>
-            </a:r>
-          </a:p>
-          <a:p>
-            <a:pPr marL="0" indent="0">
-              <a:buNone/>
-            </a:pPr>
-            <a:endParaRPr lang="en-AU" sz="1200" dirty="0" smtClean="0">
+            <a:pPr lvl="1">
+              <a:buFont typeface="Wingdings" panose="05000000000000000000" pitchFamily="2" charset="2"/>
+              <a:buChar char="§"/>
+            </a:pPr>
+            <a:r>
+              <a:rPr lang="en-AU" sz="2000" dirty="0" smtClean="0">
+                <a:solidFill>
+                  <a:schemeClr val="bg1"/>
+                </a:solidFill>
+              </a:rPr>
+              <a:t>Versions/compatibility</a:t>
+            </a:r>
+            <a:endParaRPr lang="en-AU" sz="2000" dirty="0" smtClean="0">
               <a:solidFill>
                 <a:schemeClr val="bg1"/>
               </a:solidFill>
@@ -5836,19 +6057,38 @@
               <a:buNone/>
             </a:pPr>
             <a:r>
-              <a:rPr lang="en-AU" dirty="0" smtClean="0">
-                <a:solidFill>
-                  <a:schemeClr val="bg1"/>
-                </a:solidFill>
-              </a:rPr>
-              <a:t>Version control and modifying joint code</a:t>
-            </a:r>
-          </a:p>
-          <a:p>
-            <a:pPr marL="0" indent="0">
-              <a:buNone/>
-            </a:pPr>
-            <a:endParaRPr lang="en-AU" sz="1300" dirty="0" smtClean="0">
+              <a:rPr lang="en-AU" sz="2000" dirty="0" smtClean="0">
+                <a:solidFill>
+                  <a:schemeClr val="bg1"/>
+                </a:solidFill>
+              </a:rPr>
+              <a:t>Designing the </a:t>
+            </a:r>
+            <a:r>
+              <a:rPr lang="en-AU" sz="2000" dirty="0" smtClean="0">
+                <a:solidFill>
+                  <a:schemeClr val="bg1"/>
+                </a:solidFill>
+              </a:rPr>
+              <a:t>tasks and </a:t>
+            </a:r>
+            <a:r>
+              <a:rPr lang="en-AU" sz="2000" dirty="0" smtClean="0">
+                <a:solidFill>
+                  <a:schemeClr val="bg1"/>
+                </a:solidFill>
+              </a:rPr>
+              <a:t>the movements/gestures to meet requirements and but to also consider the devices and what they can </a:t>
+            </a:r>
+            <a:r>
+              <a:rPr lang="en-AU" sz="2000" dirty="0" smtClean="0">
+                <a:solidFill>
+                  <a:schemeClr val="bg1"/>
+                </a:solidFill>
+              </a:rPr>
+              <a:t>do</a:t>
+            </a:r>
+            <a:endParaRPr lang="en-AU" sz="2000" dirty="0" smtClean="0">
               <a:solidFill>
                 <a:schemeClr val="bg1"/>
               </a:solidFill>
@@ -5858,7 +6098,23 @@
             <a:pPr marL="0" indent="0">
               <a:buNone/>
             </a:pPr>
-            <a:endParaRPr lang="en-AU" sz="1300" dirty="0" smtClean="0">
+            <a:r>
+              <a:rPr lang="en-AU" sz="2000" dirty="0" smtClean="0">
+                <a:solidFill>
+                  <a:schemeClr val="bg1"/>
+                </a:solidFill>
+              </a:rPr>
+              <a:t>Version control and modifying joint </a:t>
+            </a:r>
+            <a:r>
+              <a:rPr lang="en-AU" sz="2000" dirty="0" smtClean="0">
+                <a:solidFill>
+                  <a:schemeClr val="bg1"/>
+                </a:solidFill>
+              </a:rPr>
+              <a:t>code</a:t>
+            </a:r>
+            <a:endParaRPr lang="en-AU" sz="2000" dirty="0" smtClean="0">
               <a:solidFill>
                 <a:schemeClr val="bg1"/>
               </a:solidFill>
@@ -5869,19 +6125,22 @@
               <a:buNone/>
             </a:pPr>
             <a:r>
-              <a:rPr lang="en-AU" dirty="0" smtClean="0">
-                <a:solidFill>
-                  <a:schemeClr val="bg1"/>
-                </a:solidFill>
-              </a:rPr>
-              <a:t>Communication is essential for success</a:t>
-            </a:r>
-          </a:p>
-          <a:p>
-            <a:pPr marL="0" indent="0">
-              <a:buNone/>
-            </a:pPr>
-            <a:endParaRPr lang="en-AU" sz="1400" dirty="0" smtClean="0">
+              <a:rPr lang="en-AU" sz="2000" dirty="0" smtClean="0">
+                <a:solidFill>
+                  <a:schemeClr val="bg1"/>
+                </a:solidFill>
+              </a:rPr>
+              <a:t>Communication is essential for </a:t>
+            </a:r>
+            <a:r>
+              <a:rPr lang="en-AU" sz="2000" dirty="0" smtClean="0">
+                <a:solidFill>
+                  <a:schemeClr val="bg1"/>
+                </a:solidFill>
+              </a:rPr>
+              <a:t>success</a:t>
+            </a:r>
+            <a:endParaRPr lang="en-AU" sz="2000" dirty="0" smtClean="0">
               <a:solidFill>
                 <a:schemeClr val="bg1"/>
               </a:solidFill>
@@ -5892,19 +6151,22 @@
               <a:buNone/>
             </a:pPr>
             <a:r>
-              <a:rPr lang="en-AU" dirty="0" smtClean="0">
-                <a:solidFill>
-                  <a:schemeClr val="bg1"/>
-                </a:solidFill>
-              </a:rPr>
-              <a:t>The importance of time management</a:t>
-            </a:r>
-          </a:p>
-          <a:p>
-            <a:pPr marL="0" indent="0">
-              <a:buNone/>
-            </a:pPr>
-            <a:endParaRPr lang="en-AU" sz="1400" dirty="0" smtClean="0">
+              <a:rPr lang="en-AU" sz="2000" dirty="0" smtClean="0">
+                <a:solidFill>
+                  <a:schemeClr val="bg1"/>
+                </a:solidFill>
+              </a:rPr>
+              <a:t>The importance of time </a:t>
+            </a:r>
+            <a:r>
+              <a:rPr lang="en-AU" sz="2000" dirty="0" smtClean="0">
+                <a:solidFill>
+                  <a:schemeClr val="bg1"/>
+                </a:solidFill>
+              </a:rPr>
+              <a:t>management</a:t>
+            </a:r>
+            <a:endParaRPr lang="en-AU" sz="2000" dirty="0" smtClean="0">
               <a:solidFill>
                 <a:schemeClr val="bg1"/>
               </a:solidFill>
@@ -5915,14 +6177,14 @@
               <a:buNone/>
             </a:pPr>
             <a:r>
-              <a:rPr lang="en-AU" dirty="0" smtClean="0">
+              <a:rPr lang="en-AU" sz="2000" dirty="0" smtClean="0">
                 <a:solidFill>
                   <a:schemeClr val="bg1"/>
                 </a:solidFill>
               </a:rPr>
               <a:t>Assess and managing scope</a:t>
             </a:r>
-            <a:endParaRPr lang="en-AU" dirty="0"/>
+            <a:endParaRPr lang="en-AU" sz="2000" dirty="0"/>
           </a:p>
         </p:txBody>
       </p:sp>
@@ -6011,14 +6273,16 @@
           </a:xfrm>
         </p:spPr>
         <p:txBody>
-          <a:bodyPr/>
+          <a:bodyPr>
+            <a:normAutofit/>
+          </a:bodyPr>
           <a:lstStyle/>
           <a:p>
             <a:pPr marL="0" indent="0">
               <a:buNone/>
             </a:pPr>
             <a:r>
-              <a:rPr lang="en-AU" dirty="0" smtClean="0">
+              <a:rPr lang="en-AU" sz="2400" dirty="0" smtClean="0">
                 <a:solidFill>
                   <a:schemeClr val="bg1"/>
                 </a:solidFill>
@@ -6026,7 +6290,7 @@
               <a:t>Client – Mr </a:t>
             </a:r>
             <a:r>
-              <a:rPr lang="en-AU" dirty="0" err="1" smtClean="0">
+              <a:rPr lang="en-AU" sz="2400" dirty="0" err="1" smtClean="0">
                 <a:solidFill>
                   <a:schemeClr val="bg1"/>
                 </a:solidFill>
@@ -6034,7 +6298,7 @@
               <a:t>Shri</a:t>
             </a:r>
             <a:r>
-              <a:rPr lang="en-AU" dirty="0" smtClean="0">
+              <a:rPr lang="en-AU" sz="2400" dirty="0" smtClean="0">
                 <a:solidFill>
                   <a:schemeClr val="bg1"/>
                 </a:solidFill>
@@ -6042,14 +6306,14 @@
               <a:t> </a:t>
             </a:r>
             <a:r>
-              <a:rPr lang="en-AU" dirty="0" err="1" smtClean="0">
+              <a:rPr lang="en-AU" sz="2400" dirty="0" err="1" smtClean="0">
                 <a:solidFill>
                   <a:schemeClr val="bg1"/>
                 </a:solidFill>
               </a:rPr>
               <a:t>Rai</a:t>
             </a:r>
-            <a:endParaRPr lang="en-AU" dirty="0" smtClean="0">
+            <a:endParaRPr lang="en-AU" sz="2400" dirty="0" smtClean="0">
               <a:solidFill>
                 <a:schemeClr val="bg1"/>
               </a:solidFill>
@@ -6060,7 +6324,7 @@
               <a:buNone/>
             </a:pPr>
             <a:r>
-              <a:rPr lang="en-AU" dirty="0" smtClean="0">
+              <a:rPr lang="en-AU" sz="2400" dirty="0" smtClean="0">
                 <a:solidFill>
                   <a:schemeClr val="bg1"/>
                 </a:solidFill>
@@ -6068,7 +6332,7 @@
               <a:t>Supervisor – Dr </a:t>
             </a:r>
             <a:r>
-              <a:rPr lang="en-AU" dirty="0" err="1" smtClean="0">
+              <a:rPr lang="en-AU" sz="2400" dirty="0" err="1" smtClean="0">
                 <a:solidFill>
                   <a:schemeClr val="bg1"/>
                 </a:solidFill>
@@ -6076,7 +6340,7 @@
               <a:t>Fairuz</a:t>
             </a:r>
             <a:r>
-              <a:rPr lang="en-AU" dirty="0" smtClean="0">
+              <a:rPr lang="en-AU" sz="2400" dirty="0" smtClean="0">
                 <a:solidFill>
                   <a:schemeClr val="bg1"/>
                 </a:solidFill>
@@ -6084,14 +6348,14 @@
               <a:t> </a:t>
             </a:r>
             <a:r>
-              <a:rPr lang="en-AU" dirty="0" err="1" smtClean="0">
+              <a:rPr lang="en-AU" sz="2400" dirty="0" err="1" smtClean="0">
                 <a:solidFill>
                   <a:schemeClr val="bg1"/>
                 </a:solidFill>
               </a:rPr>
               <a:t>Shiratuddin</a:t>
             </a:r>
-            <a:endParaRPr lang="en-AU" dirty="0" smtClean="0">
+            <a:endParaRPr lang="en-AU" sz="2400" dirty="0" smtClean="0">
               <a:solidFill>
                 <a:schemeClr val="bg1"/>
               </a:solidFill>
@@ -6102,7 +6366,7 @@
               <a:buNone/>
             </a:pPr>
             <a:r>
-              <a:rPr lang="en-AU" dirty="0" smtClean="0">
+              <a:rPr lang="en-AU" sz="2400" dirty="0" smtClean="0">
                 <a:solidFill>
                   <a:schemeClr val="bg1"/>
                 </a:solidFill>
@@ -6115,7 +6379,7 @@
               <a:buNone/>
             </a:pPr>
             <a:r>
-              <a:rPr lang="en-AU" dirty="0" err="1" smtClean="0">
+              <a:rPr lang="en-AU" sz="2400" dirty="0" err="1" smtClean="0">
                 <a:solidFill>
                   <a:schemeClr val="bg1"/>
                 </a:solidFill>
@@ -6123,14 +6387,14 @@
               <a:t>Elly</a:t>
             </a:r>
             <a:r>
-              <a:rPr lang="en-AU" dirty="0" smtClean="0">
+              <a:rPr lang="en-AU" sz="2400" dirty="0" smtClean="0">
                 <a:solidFill>
                   <a:schemeClr val="bg1"/>
                 </a:solidFill>
               </a:rPr>
               <a:t> Thompson - Sounds</a:t>
             </a:r>
-            <a:endParaRPr lang="en-AU" dirty="0">
+            <a:endParaRPr lang="en-AU" sz="2400" dirty="0">
               <a:solidFill>
                 <a:schemeClr val="bg1"/>
               </a:solidFill>
@@ -6357,22 +6621,22 @@
         </p:nvSpPr>
         <p:spPr>
           <a:xfrm>
-            <a:off x="683568" y="1412776"/>
-            <a:ext cx="8003232" cy="5445224"/>
+            <a:off x="683568" y="1484784"/>
+            <a:ext cx="8003232" cy="5373216"/>
           </a:xfrm>
         </p:spPr>
         <p:txBody>
           <a:bodyPr>
-            <a:normAutofit fontScale="85000" lnSpcReduction="20000"/>
+            <a:normAutofit/>
           </a:bodyPr>
           <a:lstStyle/>
           <a:p>
             <a:pPr>
               <a:buFont typeface="Wingdings" panose="05000000000000000000" pitchFamily="2" charset="2"/>
-              <a:buChar char="v"/>
-            </a:pPr>
-            <a:r>
-              <a:rPr lang="en-AU" dirty="0" smtClean="0">
+              <a:buChar char="§"/>
+            </a:pPr>
+            <a:r>
+              <a:rPr lang="en-AU" sz="2000" dirty="0" smtClean="0">
                 <a:solidFill>
                   <a:schemeClr val="bg1"/>
                 </a:solidFill>
@@ -6383,10 +6647,10 @@
           <a:p>
             <a:pPr>
               <a:buFont typeface="Wingdings" panose="05000000000000000000" pitchFamily="2" charset="2"/>
-              <a:buChar char="v"/>
-            </a:pPr>
-            <a:r>
-              <a:rPr lang="en-AU" dirty="0" smtClean="0">
+              <a:buChar char="§"/>
+            </a:pPr>
+            <a:r>
+              <a:rPr lang="en-AU" sz="2000" dirty="0" smtClean="0">
                 <a:solidFill>
                   <a:schemeClr val="bg1"/>
                 </a:solidFill>
@@ -6397,52 +6661,73 @@
           <a:p>
             <a:pPr>
               <a:buFont typeface="Wingdings" panose="05000000000000000000" pitchFamily="2" charset="2"/>
-              <a:buChar char="v"/>
-            </a:pPr>
-            <a:r>
-              <a:rPr lang="en-AU" dirty="0" smtClean="0">
-                <a:solidFill>
-                  <a:schemeClr val="bg1"/>
-                </a:solidFill>
-              </a:rPr>
-              <a:t>Client specification</a:t>
-            </a:r>
+              <a:buChar char="§"/>
+            </a:pPr>
+            <a:r>
+              <a:rPr lang="en-AU" sz="2000" dirty="0" smtClean="0">
+                <a:solidFill>
+                  <a:schemeClr val="bg1"/>
+                </a:solidFill>
+              </a:rPr>
+              <a:t>Client </a:t>
+            </a:r>
+            <a:r>
+              <a:rPr lang="en-AU" sz="2000" dirty="0" smtClean="0">
+                <a:solidFill>
+                  <a:schemeClr val="bg1"/>
+                </a:solidFill>
+              </a:rPr>
+              <a:t>specifications</a:t>
+            </a:r>
+            <a:endParaRPr lang="en-AU" sz="2000" dirty="0" smtClean="0">
+              <a:solidFill>
+                <a:schemeClr val="bg1"/>
+              </a:solidFill>
+            </a:endParaRPr>
           </a:p>
           <a:p>
             <a:pPr>
               <a:buFont typeface="Wingdings" panose="05000000000000000000" pitchFamily="2" charset="2"/>
-              <a:buChar char="v"/>
-            </a:pPr>
-            <a:r>
-              <a:rPr lang="en-AU" dirty="0" smtClean="0">
-                <a:solidFill>
-                  <a:schemeClr val="bg1"/>
-                </a:solidFill>
-              </a:rPr>
-              <a:t>The solution and the system</a:t>
+              <a:buChar char="§"/>
+            </a:pPr>
+            <a:r>
+              <a:rPr lang="en-AU" sz="2000" dirty="0" smtClean="0">
+                <a:solidFill>
+                  <a:schemeClr val="bg1"/>
+                </a:solidFill>
+              </a:rPr>
+              <a:t>The solutions</a:t>
             </a:r>
           </a:p>
           <a:p>
             <a:pPr>
               <a:buFont typeface="Wingdings" panose="05000000000000000000" pitchFamily="2" charset="2"/>
-              <a:buChar char="v"/>
-            </a:pPr>
-            <a:r>
-              <a:rPr lang="en-AU" dirty="0" smtClean="0">
-                <a:solidFill>
-                  <a:schemeClr val="bg1"/>
-                </a:solidFill>
-              </a:rPr>
-              <a:t>Project management</a:t>
+              <a:buChar char="§"/>
+            </a:pPr>
+            <a:r>
+              <a:rPr lang="en-AU" sz="2000" dirty="0" smtClean="0">
+                <a:solidFill>
+                  <a:schemeClr val="bg1"/>
+                </a:solidFill>
+              </a:rPr>
+              <a:t>Project </a:t>
+            </a:r>
+            <a:r>
+              <a:rPr lang="en-AU" sz="2000" dirty="0" smtClean="0">
+                <a:solidFill>
+                  <a:schemeClr val="bg1"/>
+                </a:solidFill>
+              </a:rPr>
+              <a:t>management</a:t>
             </a:r>
           </a:p>
           <a:p>
             <a:pPr>
               <a:buFont typeface="Wingdings" panose="05000000000000000000" pitchFamily="2" charset="2"/>
-              <a:buChar char="v"/>
-            </a:pPr>
-            <a:r>
-              <a:rPr lang="en-AU" dirty="0" smtClean="0">
+              <a:buChar char="§"/>
+            </a:pPr>
+            <a:r>
+              <a:rPr lang="en-AU" sz="2000" dirty="0" smtClean="0">
                 <a:solidFill>
                   <a:schemeClr val="bg1"/>
                 </a:solidFill>
@@ -6453,10 +6738,10 @@
           <a:p>
             <a:pPr>
               <a:buFont typeface="Wingdings" panose="05000000000000000000" pitchFamily="2" charset="2"/>
-              <a:buChar char="v"/>
-            </a:pPr>
-            <a:r>
-              <a:rPr lang="en-AU" dirty="0" smtClean="0">
+              <a:buChar char="§"/>
+            </a:pPr>
+            <a:r>
+              <a:rPr lang="en-AU" sz="2000" dirty="0" smtClean="0">
                 <a:solidFill>
                   <a:schemeClr val="bg1"/>
                 </a:solidFill>
@@ -6467,24 +6752,32 @@
           <a:p>
             <a:pPr>
               <a:buFont typeface="Wingdings" panose="05000000000000000000" pitchFamily="2" charset="2"/>
-              <a:buChar char="v"/>
-            </a:pPr>
-            <a:r>
-              <a:rPr lang="en-AU" dirty="0" smtClean="0">
-                <a:solidFill>
-                  <a:schemeClr val="bg1"/>
-                </a:solidFill>
-              </a:rPr>
-              <a:t>Live demonstrations</a:t>
+              <a:buChar char="§"/>
+            </a:pPr>
+            <a:r>
+              <a:rPr lang="en-AU" sz="2000" dirty="0" smtClean="0">
+                <a:solidFill>
+                  <a:schemeClr val="bg1"/>
+                </a:solidFill>
+              </a:rPr>
+              <a:t>Live </a:t>
+            </a:r>
+            <a:r>
+              <a:rPr lang="en-AU" sz="2000" dirty="0" smtClean="0">
+                <a:solidFill>
+                  <a:schemeClr val="bg1"/>
+                </a:solidFill>
+              </a:rPr>
+              <a:t>demonstrations</a:t>
             </a:r>
           </a:p>
           <a:p>
             <a:pPr>
               <a:buFont typeface="Wingdings" panose="05000000000000000000" pitchFamily="2" charset="2"/>
-              <a:buChar char="v"/>
-            </a:pPr>
-            <a:r>
-              <a:rPr lang="en-AU" dirty="0" smtClean="0">
+              <a:buChar char="§"/>
+            </a:pPr>
+            <a:r>
+              <a:rPr lang="en-AU" sz="2000" dirty="0" smtClean="0">
                 <a:solidFill>
                   <a:schemeClr val="bg1"/>
                 </a:solidFill>
@@ -6495,10 +6788,10 @@
           <a:p>
             <a:pPr>
               <a:buFont typeface="Wingdings" panose="05000000000000000000" pitchFamily="2" charset="2"/>
-              <a:buChar char="v"/>
-            </a:pPr>
-            <a:r>
-              <a:rPr lang="en-AU" dirty="0" smtClean="0">
+              <a:buChar char="§"/>
+            </a:pPr>
+            <a:r>
+              <a:rPr lang="en-AU" sz="2000" dirty="0" smtClean="0">
                 <a:solidFill>
                   <a:schemeClr val="bg1"/>
                 </a:solidFill>
@@ -6509,10 +6802,10 @@
           <a:p>
             <a:pPr>
               <a:buFont typeface="Wingdings" panose="05000000000000000000" pitchFamily="2" charset="2"/>
-              <a:buChar char="v"/>
-            </a:pPr>
-            <a:r>
-              <a:rPr lang="en-AU" dirty="0" smtClean="0">
+              <a:buChar char="§"/>
+            </a:pPr>
+            <a:r>
+              <a:rPr lang="en-AU" sz="2000" dirty="0" smtClean="0">
                 <a:solidFill>
                   <a:schemeClr val="bg1"/>
                 </a:solidFill>
@@ -6523,10 +6816,10 @@
           <a:p>
             <a:pPr>
               <a:buFont typeface="Wingdings" panose="05000000000000000000" pitchFamily="2" charset="2"/>
-              <a:buChar char="v"/>
-            </a:pPr>
-            <a:r>
-              <a:rPr lang="en-AU" dirty="0" smtClean="0">
+              <a:buChar char="§"/>
+            </a:pPr>
+            <a:r>
+              <a:rPr lang="en-AU" sz="2000" dirty="0" smtClean="0">
                 <a:solidFill>
                   <a:schemeClr val="bg1"/>
                 </a:solidFill>
@@ -6537,10 +6830,10 @@
           <a:p>
             <a:pPr>
               <a:buFont typeface="Wingdings" panose="05000000000000000000" pitchFamily="2" charset="2"/>
-              <a:buChar char="v"/>
-            </a:pPr>
-            <a:r>
-              <a:rPr lang="en-AU" dirty="0" smtClean="0">
+              <a:buChar char="§"/>
+            </a:pPr>
+            <a:r>
+              <a:rPr lang="en-AU" sz="2000" dirty="0" smtClean="0">
                 <a:solidFill>
                   <a:schemeClr val="bg1"/>
                 </a:solidFill>
@@ -6553,6 +6846,47 @@
           </a:p>
         </p:txBody>
       </p:sp>
+      <p:pic>
+        <p:nvPicPr>
+          <p:cNvPr id="1026" name="Picture 2" descr="C:\Users\Hannah\Desktop\ICT313 Project\setup\Levels\Tempest Neuromend\Assets\Tempest\Resources\TitleProxy01.jpg"/>
+          <p:cNvPicPr>
+            <a:picLocks noChangeAspect="1" noChangeArrowheads="1"/>
+          </p:cNvPicPr>
+          <p:nvPr/>
+        </p:nvPicPr>
+        <p:blipFill>
+          <a:blip r:embed="rId2" cstate="print">
+            <a:extLst>
+              <a:ext uri="{28A0092B-C50C-407E-A947-70E740481C1C}">
+                <a14:useLocalDpi xmlns:a14="http://schemas.microsoft.com/office/drawing/2010/main" val="0"/>
+              </a:ext>
+            </a:extLst>
+          </a:blip>
+          <a:srcRect/>
+          <a:stretch>
+            <a:fillRect/>
+          </a:stretch>
+        </p:blipFill>
+        <p:spPr bwMode="auto">
+          <a:xfrm>
+            <a:off x="3347864" y="1161872"/>
+            <a:ext cx="5544616" cy="4221907"/>
+          </a:xfrm>
+          <a:prstGeom prst="rect">
+            <a:avLst/>
+          </a:prstGeom>
+          <a:noFill/>
+          <a:extLst>
+            <a:ext uri="{909E8E84-426E-40DD-AFC4-6F175D3DCCD1}">
+              <a14:hiddenFill xmlns:a14="http://schemas.microsoft.com/office/drawing/2010/main">
+                <a:solidFill>
+                  <a:srgbClr val="FFFFFF"/>
+                </a:solidFill>
+              </a14:hiddenFill>
+            </a:ext>
+          </a:extLst>
+        </p:spPr>
+      </p:pic>
     </p:spTree>
     <p:extLst>
       <p:ext uri="{BB962C8B-B14F-4D97-AF65-F5344CB8AC3E}">
@@ -6611,7 +6945,7 @@
                   <a:schemeClr val="bg1"/>
                 </a:solidFill>
               </a:rPr>
-              <a:t>Introduction</a:t>
+              <a:t>Project Introduction</a:t>
             </a:r>
             <a:endParaRPr lang="en-AU" b="1" dirty="0">
               <a:solidFill>
@@ -6639,7 +6973,7 @@
         </p:spPr>
         <p:txBody>
           <a:bodyPr>
-            <a:normAutofit fontScale="92500" lnSpcReduction="20000"/>
+            <a:normAutofit lnSpcReduction="10000"/>
           </a:bodyPr>
           <a:lstStyle/>
           <a:p>
@@ -6647,7 +6981,7 @@
               <a:buNone/>
             </a:pPr>
             <a:r>
-              <a:rPr lang="en-AU" dirty="0">
+              <a:rPr lang="en-AU" sz="2200" dirty="0">
                 <a:solidFill>
                   <a:schemeClr val="bg1"/>
                 </a:solidFill>
@@ -6655,14 +6989,14 @@
               <a:t>Project Name: </a:t>
             </a:r>
             <a:r>
-              <a:rPr lang="en-AU" dirty="0" err="1" smtClean="0">
+              <a:rPr lang="en-AU" sz="2200" dirty="0" err="1" smtClean="0">
                 <a:solidFill>
                   <a:schemeClr val="bg1"/>
                 </a:solidFill>
               </a:rPr>
               <a:t>Neuromend</a:t>
             </a:r>
-            <a:endParaRPr lang="en-AU" dirty="0" smtClean="0">
+            <a:endParaRPr lang="en-AU" sz="2200" dirty="0" smtClean="0">
               <a:solidFill>
                 <a:schemeClr val="bg1"/>
               </a:solidFill>
@@ -6673,7 +7007,7 @@
               <a:buNone/>
             </a:pPr>
             <a:r>
-              <a:rPr lang="en-AU" dirty="0" smtClean="0">
+              <a:rPr lang="en-AU" sz="2200" dirty="0" smtClean="0">
                 <a:solidFill>
                   <a:schemeClr val="bg1"/>
                 </a:solidFill>
@@ -6681,7 +7015,7 @@
               <a:t>Client</a:t>
             </a:r>
             <a:r>
-              <a:rPr lang="en-AU" dirty="0">
+              <a:rPr lang="en-AU" sz="2200" dirty="0">
                 <a:solidFill>
                   <a:schemeClr val="bg1"/>
                 </a:solidFill>
@@ -6689,7 +7023,7 @@
               <a:t>: </a:t>
             </a:r>
             <a:r>
-              <a:rPr lang="en-AU" dirty="0" err="1" smtClean="0">
+              <a:rPr lang="en-AU" sz="2200" dirty="0" err="1" smtClean="0">
                 <a:solidFill>
                   <a:schemeClr val="bg1"/>
                 </a:solidFill>
@@ -6697,7 +7031,7 @@
               <a:t>Shri</a:t>
             </a:r>
             <a:r>
-              <a:rPr lang="en-AU" dirty="0" smtClean="0">
+              <a:rPr lang="en-AU" sz="2200" dirty="0" smtClean="0">
                 <a:solidFill>
                   <a:schemeClr val="bg1"/>
                 </a:solidFill>
@@ -6705,7 +7039,7 @@
               <a:t> </a:t>
             </a:r>
             <a:r>
-              <a:rPr lang="en-AU" dirty="0" err="1" smtClean="0">
+              <a:rPr lang="en-AU" sz="2200" dirty="0" err="1" smtClean="0">
                 <a:solidFill>
                   <a:schemeClr val="bg1"/>
                 </a:solidFill>
@@ -6713,14 +7047,14 @@
               <a:t>Rai</a:t>
             </a:r>
             <a:r>
-              <a:rPr lang="en-AU" dirty="0" smtClean="0">
+              <a:rPr lang="en-AU" sz="2200" dirty="0" smtClean="0">
                 <a:solidFill>
                   <a:schemeClr val="bg1"/>
                 </a:solidFill>
               </a:rPr>
               <a:t>, Murdoch School of Engineering &amp; IT</a:t>
             </a:r>
-            <a:endParaRPr lang="en-AU" dirty="0">
+            <a:endParaRPr lang="en-AU" sz="2200" dirty="0">
               <a:solidFill>
                 <a:schemeClr val="bg1"/>
               </a:solidFill>
@@ -6731,7 +7065,7 @@
               <a:buNone/>
             </a:pPr>
             <a:r>
-              <a:rPr lang="en-AU" dirty="0">
+              <a:rPr lang="en-AU" sz="2200" dirty="0">
                 <a:solidFill>
                   <a:schemeClr val="bg1"/>
                 </a:solidFill>
@@ -6739,7 +7073,7 @@
               <a:t>Supervisor: </a:t>
             </a:r>
             <a:r>
-              <a:rPr lang="en-AU" dirty="0" err="1" smtClean="0">
+              <a:rPr lang="en-AU" sz="2200" dirty="0" err="1" smtClean="0">
                 <a:solidFill>
                   <a:schemeClr val="bg1"/>
                 </a:solidFill>
@@ -6747,7 +7081,7 @@
               <a:t>Fairuz</a:t>
             </a:r>
             <a:r>
-              <a:rPr lang="en-AU" dirty="0" smtClean="0">
+              <a:rPr lang="en-AU" sz="2200" dirty="0" smtClean="0">
                 <a:solidFill>
                   <a:schemeClr val="bg1"/>
                 </a:solidFill>
@@ -6755,14 +7089,14 @@
               <a:t> </a:t>
             </a:r>
             <a:r>
-              <a:rPr lang="en-AU" dirty="0" err="1">
+              <a:rPr lang="en-AU" sz="2200" dirty="0" err="1">
                 <a:solidFill>
                   <a:schemeClr val="bg1"/>
                 </a:solidFill>
               </a:rPr>
               <a:t>Shiratuddin</a:t>
             </a:r>
-            <a:endParaRPr lang="en-AU" dirty="0">
+            <a:endParaRPr lang="en-AU" sz="2200" dirty="0">
               <a:solidFill>
                 <a:schemeClr val="bg1"/>
               </a:solidFill>
@@ -6773,7 +7107,7 @@
               <a:buNone/>
             </a:pPr>
             <a:r>
-              <a:rPr lang="en-AU" dirty="0" smtClean="0">
+              <a:rPr lang="en-AU" sz="2200" dirty="0" smtClean="0">
                 <a:solidFill>
                   <a:schemeClr val="bg1"/>
                 </a:solidFill>
@@ -6787,7 +7121,7 @@
               <a:buChar char="§"/>
             </a:pPr>
             <a:r>
-              <a:rPr lang="en-AU" dirty="0" smtClean="0">
+              <a:rPr lang="en-AU" sz="2200" dirty="0" smtClean="0">
                 <a:solidFill>
                   <a:schemeClr val="bg1"/>
                 </a:solidFill>
@@ -6795,7 +7129,7 @@
               <a:t>Ary Bizar </a:t>
             </a:r>
             <a:r>
-              <a:rPr lang="en-AU" sz="2400" i="1" dirty="0">
+              <a:rPr lang="en-AU" sz="2200" i="1" dirty="0">
                 <a:solidFill>
                   <a:schemeClr val="bg1"/>
                 </a:solidFill>
@@ -6803,7 +7137,7 @@
               <a:t>(</a:t>
             </a:r>
             <a:r>
-              <a:rPr lang="en-AU" sz="2400" i="1" dirty="0" err="1">
+              <a:rPr lang="en-AU" sz="2200" i="1" dirty="0" err="1">
                 <a:solidFill>
                   <a:schemeClr val="bg1"/>
                 </a:solidFill>
@@ -6811,7 +7145,7 @@
               <a:t>Bsc</a:t>
             </a:r>
             <a:r>
-              <a:rPr lang="en-AU" sz="2400" i="1" dirty="0">
+              <a:rPr lang="en-AU" sz="2200" i="1" dirty="0">
                 <a:solidFill>
                   <a:schemeClr val="bg1"/>
                 </a:solidFill>
@@ -6819,7 +7153,7 @@
               <a:t>, </a:t>
             </a:r>
             <a:r>
-              <a:rPr lang="en-AU" sz="2400" i="1" dirty="0" smtClean="0">
+              <a:rPr lang="en-AU" sz="2200" i="1" dirty="0" smtClean="0">
                 <a:solidFill>
                   <a:schemeClr val="bg1"/>
                 </a:solidFill>
@@ -6833,14 +7167,14 @@
               <a:buChar char="§"/>
             </a:pPr>
             <a:r>
-              <a:rPr lang="en-AU" sz="2000" i="1" dirty="0" smtClean="0">
+              <a:rPr lang="en-AU" sz="2200" i="1" dirty="0" smtClean="0">
                 <a:solidFill>
                   <a:schemeClr val="bg1"/>
                 </a:solidFill>
               </a:rPr>
               <a:t>Level designer, Asset creator</a:t>
             </a:r>
-            <a:endParaRPr lang="en-AU" sz="2000" dirty="0" smtClean="0">
+            <a:endParaRPr lang="en-AU" sz="2200" dirty="0" smtClean="0">
               <a:solidFill>
                 <a:schemeClr val="bg1"/>
               </a:solidFill>
@@ -6852,7 +7186,7 @@
               <a:buChar char="§"/>
             </a:pPr>
             <a:r>
-              <a:rPr lang="en-AU" dirty="0" smtClean="0">
+              <a:rPr lang="en-AU" sz="2200" dirty="0" smtClean="0">
                 <a:solidFill>
                   <a:schemeClr val="bg1"/>
                 </a:solidFill>
@@ -6860,7 +7194,7 @@
               <a:t>Anopan Kandiah </a:t>
             </a:r>
             <a:r>
-              <a:rPr lang="en-AU" sz="2400" i="1" dirty="0">
+              <a:rPr lang="en-AU" sz="2200" i="1" dirty="0">
                 <a:solidFill>
                   <a:schemeClr val="bg1"/>
                 </a:solidFill>
@@ -6868,7 +7202,7 @@
               <a:t>(</a:t>
             </a:r>
             <a:r>
-              <a:rPr lang="en-AU" sz="2400" i="1" dirty="0" err="1">
+              <a:rPr lang="en-AU" sz="2200" i="1" dirty="0" err="1">
                 <a:solidFill>
                   <a:schemeClr val="bg1"/>
                 </a:solidFill>
@@ -6876,7 +7210,7 @@
               <a:t>Bsc</a:t>
             </a:r>
             <a:r>
-              <a:rPr lang="en-AU" sz="2400" i="1" dirty="0">
+              <a:rPr lang="en-AU" sz="2200" i="1" dirty="0">
                 <a:solidFill>
                   <a:schemeClr val="bg1"/>
                 </a:solidFill>
@@ -6884,7 +7218,7 @@
               <a:t>, Computer Science, Games Technology</a:t>
             </a:r>
             <a:r>
-              <a:rPr lang="en-AU" sz="2400" i="1" dirty="0" smtClean="0">
+              <a:rPr lang="en-AU" sz="2200" i="1" dirty="0" smtClean="0">
                 <a:solidFill>
                   <a:schemeClr val="bg1"/>
                 </a:solidFill>
@@ -6898,7 +7232,7 @@
               <a:buChar char="§"/>
             </a:pPr>
             <a:r>
-              <a:rPr lang="en-AU" sz="2000" i="1" dirty="0" err="1" smtClean="0">
+              <a:rPr lang="en-AU" sz="2200" i="1" dirty="0" err="1" smtClean="0">
                 <a:solidFill>
                   <a:schemeClr val="bg1"/>
                 </a:solidFill>
@@ -6906,14 +7240,14 @@
               <a:t>Kinect</a:t>
             </a:r>
             <a:r>
-              <a:rPr lang="en-AU" sz="2000" i="1" dirty="0" smtClean="0">
+              <a:rPr lang="en-AU" sz="2200" i="1" dirty="0" smtClean="0">
                 <a:solidFill>
                   <a:schemeClr val="bg1"/>
                 </a:solidFill>
               </a:rPr>
               <a:t> development</a:t>
             </a:r>
-            <a:endParaRPr lang="en-AU" sz="2000" dirty="0" smtClean="0">
+            <a:endParaRPr lang="en-AU" sz="2200" dirty="0" smtClean="0">
               <a:solidFill>
                 <a:schemeClr val="bg1"/>
               </a:solidFill>
@@ -6925,7 +7259,7 @@
               <a:buChar char="§"/>
             </a:pPr>
             <a:r>
-              <a:rPr lang="en-AU" dirty="0" smtClean="0">
+              <a:rPr lang="en-AU" sz="2200" dirty="0" smtClean="0">
                 <a:solidFill>
                   <a:schemeClr val="bg1"/>
                 </a:solidFill>
@@ -6933,7 +7267,7 @@
               <a:t>Hannah Klinac </a:t>
             </a:r>
             <a:r>
-              <a:rPr lang="en-AU" sz="2400" i="1" dirty="0">
+              <a:rPr lang="en-AU" sz="2200" i="1" dirty="0">
                 <a:solidFill>
                   <a:schemeClr val="bg1"/>
                 </a:solidFill>
@@ -6941,7 +7275,7 @@
               <a:t>(</a:t>
             </a:r>
             <a:r>
-              <a:rPr lang="en-AU" sz="2400" i="1" dirty="0" err="1">
+              <a:rPr lang="en-AU" sz="2200" i="1" dirty="0" err="1">
                 <a:solidFill>
                   <a:schemeClr val="bg1"/>
                 </a:solidFill>
@@ -6949,7 +7283,7 @@
               <a:t>Bsc</a:t>
             </a:r>
             <a:r>
-              <a:rPr lang="en-AU" sz="2400" i="1" dirty="0">
+              <a:rPr lang="en-AU" sz="2200" i="1" dirty="0">
                 <a:solidFill>
                   <a:schemeClr val="bg1"/>
                 </a:solidFill>
@@ -6957,7 +7291,7 @@
               <a:t>, Computer Science, Games Technology</a:t>
             </a:r>
             <a:r>
-              <a:rPr lang="en-AU" sz="2400" i="1" dirty="0" smtClean="0">
+              <a:rPr lang="en-AU" sz="2200" i="1" dirty="0" smtClean="0">
                 <a:solidFill>
                   <a:schemeClr val="bg1"/>
                 </a:solidFill>
@@ -6971,14 +7305,14 @@
               <a:buChar char="§"/>
             </a:pPr>
             <a:r>
-              <a:rPr lang="en-AU" sz="2000" i="1" dirty="0" smtClean="0">
+              <a:rPr lang="en-AU" sz="2200" i="1" dirty="0" smtClean="0">
                 <a:solidFill>
                   <a:schemeClr val="bg1"/>
                 </a:solidFill>
               </a:rPr>
               <a:t>Leap Motion development, Project Manager</a:t>
             </a:r>
-            <a:endParaRPr lang="en-AU" sz="2000" dirty="0" smtClean="0">
+            <a:endParaRPr lang="en-AU" sz="2200" dirty="0" smtClean="0">
               <a:solidFill>
                 <a:schemeClr val="bg1"/>
               </a:solidFill>
@@ -6990,7 +7324,7 @@
               <a:buChar char="§"/>
             </a:pPr>
             <a:r>
-              <a:rPr lang="en-AU" dirty="0" smtClean="0">
+              <a:rPr lang="en-AU" sz="2200" dirty="0" smtClean="0">
                 <a:solidFill>
                   <a:schemeClr val="bg1"/>
                 </a:solidFill>
@@ -6998,7 +7332,7 @@
               <a:t>Alex Mlodawski </a:t>
             </a:r>
             <a:r>
-              <a:rPr lang="en-AU" sz="2400" i="1" dirty="0">
+              <a:rPr lang="en-AU" sz="2200" i="1" dirty="0">
                 <a:solidFill>
                   <a:schemeClr val="bg1"/>
                 </a:solidFill>
@@ -7006,7 +7340,7 @@
               <a:t>(</a:t>
             </a:r>
             <a:r>
-              <a:rPr lang="en-AU" sz="2400" i="1" dirty="0" err="1">
+              <a:rPr lang="en-AU" sz="2200" i="1" dirty="0" err="1">
                 <a:solidFill>
                   <a:schemeClr val="bg1"/>
                 </a:solidFill>
@@ -7014,7 +7348,7 @@
               <a:t>Bsc</a:t>
             </a:r>
             <a:r>
-              <a:rPr lang="en-AU" sz="2400" i="1" dirty="0">
+              <a:rPr lang="en-AU" sz="2200" i="1" dirty="0">
                 <a:solidFill>
                   <a:schemeClr val="bg1"/>
                 </a:solidFill>
@@ -7022,7 +7356,7 @@
               <a:t>, Computer Science, Games Technology</a:t>
             </a:r>
             <a:r>
-              <a:rPr lang="en-AU" sz="2400" i="1" dirty="0" smtClean="0">
+              <a:rPr lang="en-AU" sz="2200" i="1" dirty="0" smtClean="0">
                 <a:solidFill>
                   <a:schemeClr val="bg1"/>
                 </a:solidFill>
@@ -7036,7 +7370,7 @@
               <a:buChar char="§"/>
             </a:pPr>
             <a:r>
-              <a:rPr lang="en-AU" sz="2000" i="1" dirty="0" err="1" smtClean="0">
+              <a:rPr lang="en-AU" sz="2200" i="1" dirty="0" err="1" smtClean="0">
                 <a:solidFill>
                   <a:schemeClr val="bg1"/>
                 </a:solidFill>
@@ -7044,14 +7378,14 @@
               <a:t>Kinect</a:t>
             </a:r>
             <a:r>
-              <a:rPr lang="en-AU" sz="2000" i="1" dirty="0" smtClean="0">
+              <a:rPr lang="en-AU" sz="2200" i="1" dirty="0" smtClean="0">
                 <a:solidFill>
                   <a:schemeClr val="bg1"/>
                 </a:solidFill>
               </a:rPr>
               <a:t> development</a:t>
             </a:r>
-            <a:endParaRPr lang="en-AU" sz="2000" dirty="0" smtClean="0">
+            <a:endParaRPr lang="en-AU" sz="2200" dirty="0" smtClean="0">
               <a:solidFill>
                 <a:schemeClr val="bg1"/>
               </a:solidFill>
@@ -7063,7 +7397,7 @@
               <a:buChar char="§"/>
             </a:pPr>
             <a:r>
-              <a:rPr lang="en-AU" dirty="0" smtClean="0">
+              <a:rPr lang="en-AU" sz="2200" dirty="0" smtClean="0">
                 <a:solidFill>
                   <a:schemeClr val="bg1"/>
                 </a:solidFill>
@@ -7071,7 +7405,7 @@
               <a:t>Bryan Yu </a:t>
             </a:r>
             <a:r>
-              <a:rPr lang="en-AU" sz="2400" i="1" dirty="0" smtClean="0">
+              <a:rPr lang="en-AU" sz="2200" i="1" dirty="0" smtClean="0">
                 <a:solidFill>
                   <a:schemeClr val="bg1"/>
                 </a:solidFill>
@@ -7079,7 +7413,7 @@
               <a:t>(</a:t>
             </a:r>
             <a:r>
-              <a:rPr lang="en-AU" sz="2400" i="1" dirty="0" err="1" smtClean="0">
+              <a:rPr lang="en-AU" sz="2200" i="1" dirty="0" err="1" smtClean="0">
                 <a:solidFill>
                   <a:schemeClr val="bg1"/>
                 </a:solidFill>
@@ -7087,7 +7421,7 @@
               <a:t>Bsc</a:t>
             </a:r>
             <a:r>
-              <a:rPr lang="en-AU" sz="2400" i="1" dirty="0" smtClean="0">
+              <a:rPr lang="en-AU" sz="2200" i="1" dirty="0" smtClean="0">
                 <a:solidFill>
                   <a:schemeClr val="bg1"/>
                 </a:solidFill>
@@ -7101,7 +7435,7 @@
               <a:buChar char="§"/>
             </a:pPr>
             <a:r>
-              <a:rPr lang="en-AU" sz="2000" i="1" dirty="0" smtClean="0">
+              <a:rPr lang="en-AU" sz="2200" i="1" dirty="0" smtClean="0">
                 <a:solidFill>
                   <a:schemeClr val="bg1"/>
                 </a:solidFill>
@@ -7210,14 +7544,68 @@
               <a:buNone/>
             </a:pPr>
             <a:r>
-              <a:rPr lang="en-AU" dirty="0" smtClean="0">
+              <a:rPr lang="en-AU" sz="2000" dirty="0" smtClean="0">
                 <a:solidFill>
                   <a:schemeClr val="bg1"/>
                 </a:solidFill>
               </a:rPr>
               <a:t>Stroke</a:t>
             </a:r>
-            <a:endParaRPr lang="en-AU" dirty="0" smtClean="0">
+          </a:p>
+          <a:p>
+            <a:pPr lvl="1">
+              <a:buFont typeface="Wingdings" panose="05000000000000000000" pitchFamily="2" charset="2"/>
+              <a:buChar char="§"/>
+            </a:pPr>
+            <a:r>
+              <a:rPr lang="en-AU" sz="2000" dirty="0" smtClean="0">
+                <a:solidFill>
+                  <a:schemeClr val="bg1"/>
+                </a:solidFill>
+              </a:rPr>
+              <a:t>Parts of the brain may be damaged or may die</a:t>
+            </a:r>
+          </a:p>
+          <a:p>
+            <a:pPr lvl="1">
+              <a:buFont typeface="Wingdings" panose="05000000000000000000" pitchFamily="2" charset="2"/>
+              <a:buChar char="§"/>
+            </a:pPr>
+            <a:r>
+              <a:rPr lang="en-AU" sz="2000" dirty="0" smtClean="0">
+                <a:solidFill>
+                  <a:schemeClr val="bg1"/>
+                </a:solidFill>
+              </a:rPr>
+              <a:t>This can result some loss of motor control</a:t>
+            </a:r>
+          </a:p>
+          <a:p>
+            <a:pPr marL="0" indent="0">
+              <a:buNone/>
+            </a:pPr>
+            <a:r>
+              <a:rPr lang="en-AU" sz="2000" dirty="0" smtClean="0">
+                <a:solidFill>
+                  <a:schemeClr val="bg1"/>
+                </a:solidFill>
+              </a:rPr>
+              <a:t>One form of rehabilitation is rewiring</a:t>
+            </a:r>
+          </a:p>
+          <a:p>
+            <a:pPr marL="0" indent="0">
+              <a:buNone/>
+            </a:pPr>
+            <a:r>
+              <a:rPr lang="en-AU" sz="2000" dirty="0" smtClean="0">
+                <a:solidFill>
+                  <a:schemeClr val="bg1"/>
+                </a:solidFill>
+              </a:rPr>
+              <a:t>Rehabilitation</a:t>
+            </a:r>
+            <a:endParaRPr lang="en-AU" sz="2000" dirty="0" smtClean="0">
               <a:solidFill>
                 <a:schemeClr val="bg1"/>
               </a:solidFill>
@@ -7229,12 +7617,12 @@
               <a:buChar char="§"/>
             </a:pPr>
             <a:r>
-              <a:rPr lang="en-AU" dirty="0" smtClean="0">
-                <a:solidFill>
-                  <a:schemeClr val="bg1"/>
-                </a:solidFill>
-              </a:rPr>
-              <a:t>Parts of the brain may be damaged or may die</a:t>
+              <a:rPr lang="en-AU" sz="2000" dirty="0" smtClean="0">
+                <a:solidFill>
+                  <a:schemeClr val="bg1"/>
+                </a:solidFill>
+              </a:rPr>
+              <a:t>Accessibility</a:t>
             </a:r>
           </a:p>
           <a:p>
@@ -7243,68 +7631,14 @@
               <a:buChar char="§"/>
             </a:pPr>
             <a:r>
-              <a:rPr lang="en-AU" dirty="0" smtClean="0">
-                <a:solidFill>
-                  <a:schemeClr val="bg1"/>
-                </a:solidFill>
-              </a:rPr>
-              <a:t>This can result some loss of motor control</a:t>
-            </a:r>
-          </a:p>
-          <a:p>
-            <a:pPr marL="0" indent="0">
-              <a:buNone/>
-            </a:pPr>
-            <a:r>
-              <a:rPr lang="en-AU" dirty="0" smtClean="0">
-                <a:solidFill>
-                  <a:schemeClr val="bg1"/>
-                </a:solidFill>
-              </a:rPr>
-              <a:t>One form of rehabilitation is rewiring</a:t>
-            </a:r>
-          </a:p>
-          <a:p>
-            <a:pPr marL="0" indent="0">
-              <a:buNone/>
-            </a:pPr>
-            <a:r>
-              <a:rPr lang="en-AU" dirty="0" smtClean="0">
-                <a:solidFill>
-                  <a:schemeClr val="bg1"/>
-                </a:solidFill>
-              </a:rPr>
-              <a:t>Rehabilitation</a:t>
-            </a:r>
-          </a:p>
-          <a:p>
-            <a:pPr lvl="1">
-              <a:buFont typeface="Wingdings" panose="05000000000000000000" pitchFamily="2" charset="2"/>
-              <a:buChar char="§"/>
-            </a:pPr>
-            <a:r>
-              <a:rPr lang="en-AU" dirty="0" smtClean="0">
-                <a:solidFill>
-                  <a:schemeClr val="bg1"/>
-                </a:solidFill>
-              </a:rPr>
-              <a:t>Accessibility</a:t>
-            </a:r>
-          </a:p>
-          <a:p>
-            <a:pPr lvl="1">
-              <a:buFont typeface="Wingdings" panose="05000000000000000000" pitchFamily="2" charset="2"/>
-              <a:buChar char="§"/>
-            </a:pPr>
-            <a:r>
-              <a:rPr lang="en-AU" dirty="0" smtClean="0">
+              <a:rPr lang="en-AU" sz="2000" dirty="0" smtClean="0">
                 <a:solidFill>
                   <a:schemeClr val="bg1"/>
                 </a:solidFill>
               </a:rPr>
               <a:t>Money</a:t>
             </a:r>
-            <a:endParaRPr lang="en-AU" dirty="0">
+            <a:endParaRPr lang="en-AU" sz="2000" dirty="0">
               <a:solidFill>
                 <a:schemeClr val="bg1"/>
               </a:solidFill>
@@ -7316,14 +7650,14 @@
               <a:buChar char="§"/>
             </a:pPr>
             <a:r>
-              <a:rPr lang="en-AU" dirty="0" smtClean="0">
+              <a:rPr lang="en-AU" sz="2000" dirty="0" smtClean="0">
                 <a:solidFill>
                   <a:schemeClr val="bg1"/>
                 </a:solidFill>
               </a:rPr>
               <a:t>Tedious/boring – no incremental goals</a:t>
             </a:r>
-            <a:endParaRPr lang="en-AU" dirty="0">
+            <a:endParaRPr lang="en-AU" sz="2000" dirty="0">
               <a:solidFill>
                 <a:schemeClr val="bg1"/>
               </a:solidFill>
@@ -7335,13 +7669,18 @@
               <a:buChar char="§"/>
             </a:pPr>
             <a:r>
-              <a:rPr lang="en-AU" dirty="0" smtClean="0">
+              <a:rPr lang="en-AU" sz="2000" dirty="0" smtClean="0">
                 <a:solidFill>
                   <a:schemeClr val="bg1"/>
                 </a:solidFill>
               </a:rPr>
               <a:t>Limited</a:t>
             </a:r>
+            <a:endParaRPr lang="en-AU" sz="2000" dirty="0" smtClean="0">
+              <a:solidFill>
+                <a:schemeClr val="bg1"/>
+              </a:solidFill>
+            </a:endParaRPr>
           </a:p>
         </p:txBody>
       </p:sp>
@@ -7394,16 +7733,18 @@
         </p:nvSpPr>
         <p:spPr/>
         <p:txBody>
-          <a:bodyPr/>
+          <a:bodyPr>
+            <a:normAutofit fontScale="90000"/>
+          </a:bodyPr>
           <a:lstStyle/>
           <a:p>
             <a:r>
-              <a:rPr lang="en-AU" b="1" dirty="0">
-                <a:solidFill>
-                  <a:schemeClr val="bg1"/>
-                </a:solidFill>
-              </a:rPr>
-              <a:t>Client Specification</a:t>
+              <a:rPr lang="en-AU" b="1" dirty="0" smtClean="0">
+                <a:solidFill>
+                  <a:schemeClr val="bg1"/>
+                </a:solidFill>
+              </a:rPr>
+              <a:t>Project Specifications &amp; Requirements</a:t>
             </a:r>
             <a:endParaRPr lang="en-AU" dirty="0"/>
           </a:p>
@@ -7427,7 +7768,7 @@
         </p:spPr>
         <p:txBody>
           <a:bodyPr>
-            <a:normAutofit fontScale="92500" lnSpcReduction="20000"/>
+            <a:normAutofit fontScale="92500" lnSpcReduction="10000"/>
           </a:bodyPr>
           <a:lstStyle/>
           <a:p>
@@ -7435,21 +7776,26 @@
               <a:buNone/>
             </a:pPr>
             <a:r>
-              <a:rPr lang="en-AU" dirty="0">
-                <a:solidFill>
-                  <a:schemeClr val="bg1"/>
-                </a:solidFill>
-              </a:rPr>
-              <a:t>Client </a:t>
-            </a:r>
-            <a:r>
-              <a:rPr lang="en-AU" dirty="0" smtClean="0">
-                <a:solidFill>
-                  <a:schemeClr val="bg1"/>
-                </a:solidFill>
-              </a:rPr>
-              <a:t>specification</a:t>
-            </a:r>
+              <a:rPr lang="en-AU" sz="2200" dirty="0">
+                <a:solidFill>
+                  <a:schemeClr val="bg1"/>
+                </a:solidFill>
+              </a:rPr>
+              <a:t>S</a:t>
+            </a:r>
+            <a:r>
+              <a:rPr lang="en-AU" sz="2200" dirty="0" smtClean="0">
+                <a:solidFill>
+                  <a:schemeClr val="bg1"/>
+                </a:solidFill>
+              </a:rPr>
+              <a:t>pecifications</a:t>
+            </a:r>
+            <a:endParaRPr lang="en-AU" sz="2200" dirty="0" smtClean="0">
+              <a:solidFill>
+                <a:schemeClr val="bg1"/>
+              </a:solidFill>
+            </a:endParaRPr>
           </a:p>
           <a:p>
             <a:pPr lvl="1">
@@ -7457,13 +7803,26 @@
               <a:buChar char="§"/>
             </a:pPr>
             <a:r>
-              <a:rPr lang="en-AU" dirty="0">
-                <a:solidFill>
-                  <a:schemeClr val="bg1"/>
-                </a:solidFill>
-              </a:rPr>
-              <a:t>Create a simulation that could have the same effect as current rehabilitation methods while potentially reducing the downsides</a:t>
-            </a:r>
+              <a:rPr lang="en-AU" sz="2400" dirty="0">
+                <a:solidFill>
+                  <a:schemeClr val="bg1"/>
+                </a:solidFill>
+              </a:rPr>
+              <a:t>This idea of simulation rehabilitation inducing rewiring is an international theory currently being </a:t>
+            </a:r>
+            <a:r>
+              <a:rPr lang="en-AU" sz="2400" dirty="0" smtClean="0">
+                <a:solidFill>
+                  <a:schemeClr val="bg1"/>
+                </a:solidFill>
+              </a:rPr>
+              <a:t>tested</a:t>
+            </a:r>
+            <a:endParaRPr lang="en-AU" sz="2200" dirty="0" smtClean="0">
+              <a:solidFill>
+                <a:schemeClr val="bg1"/>
+              </a:solidFill>
+            </a:endParaRPr>
           </a:p>
           <a:p>
             <a:pPr lvl="1">
@@ -7471,20 +7830,40 @@
               <a:buChar char="§"/>
             </a:pPr>
             <a:r>
-              <a:rPr lang="en-AU" dirty="0" smtClean="0">
-                <a:solidFill>
-                  <a:schemeClr val="bg1"/>
-                </a:solidFill>
-              </a:rPr>
-              <a:t>This </a:t>
-            </a:r>
-            <a:r>
-              <a:rPr lang="en-AU" dirty="0">
-                <a:solidFill>
-                  <a:schemeClr val="bg1"/>
-                </a:solidFill>
-              </a:rPr>
-              <a:t>project is essentially an evaluation step towards a more concrete implementation</a:t>
+              <a:rPr lang="en-AU" sz="2200" dirty="0" smtClean="0">
+                <a:solidFill>
+                  <a:schemeClr val="bg1"/>
+                </a:solidFill>
+              </a:rPr>
+              <a:t>This project is one of the first steps toward establishing a stroke rehabilitation system</a:t>
+            </a:r>
+          </a:p>
+          <a:p>
+            <a:pPr lvl="2">
+              <a:buFont typeface="Wingdings" panose="05000000000000000000" pitchFamily="2" charset="2"/>
+              <a:buChar char="§"/>
+            </a:pPr>
+            <a:r>
+              <a:rPr lang="en-AU" sz="2200" dirty="0" smtClean="0">
+                <a:solidFill>
+                  <a:schemeClr val="bg1"/>
+                </a:solidFill>
+              </a:rPr>
+              <a:t>This project involves developing the prototype platform</a:t>
+            </a:r>
+          </a:p>
+          <a:p>
+            <a:pPr lvl="2">
+              <a:buFont typeface="Wingdings" panose="05000000000000000000" pitchFamily="2" charset="2"/>
+              <a:buChar char="§"/>
+            </a:pPr>
+            <a:r>
+              <a:rPr lang="en-AU" sz="2000" dirty="0" smtClean="0">
+                <a:solidFill>
+                  <a:schemeClr val="bg1"/>
+                </a:solidFill>
+              </a:rPr>
+              <a:t>Testing will be done next semester</a:t>
             </a:r>
           </a:p>
           <a:p>
@@ -7492,13 +7871,26 @@
               <a:buNone/>
             </a:pPr>
             <a:r>
-              <a:rPr lang="en-AU" dirty="0">
-                <a:solidFill>
-                  <a:schemeClr val="bg1"/>
-                </a:solidFill>
-              </a:rPr>
-              <a:t>Client requirements</a:t>
-            </a:r>
+              <a:rPr lang="en-AU" sz="2200" dirty="0" smtClean="0">
+                <a:solidFill>
+                  <a:schemeClr val="bg1"/>
+                </a:solidFill>
+              </a:rPr>
+              <a:t>R</a:t>
+            </a:r>
+            <a:r>
+              <a:rPr lang="en-AU" sz="2200" dirty="0" smtClean="0">
+                <a:solidFill>
+                  <a:schemeClr val="bg1"/>
+                </a:solidFill>
+              </a:rPr>
+              <a:t>equirements</a:t>
+            </a:r>
+            <a:endParaRPr lang="en-AU" sz="2200" dirty="0">
+              <a:solidFill>
+                <a:schemeClr val="bg1"/>
+              </a:solidFill>
+            </a:endParaRPr>
           </a:p>
           <a:p>
             <a:pPr lvl="1">
@@ -7506,13 +7898,34 @@
               <a:buChar char="§"/>
             </a:pPr>
             <a:r>
-              <a:rPr lang="en-AU" dirty="0">
-                <a:solidFill>
-                  <a:schemeClr val="bg1"/>
-                </a:solidFill>
-              </a:rPr>
-              <a:t> Virtual Simulation</a:t>
-            </a:r>
+              <a:rPr lang="en-AU" sz="2200" dirty="0" smtClean="0">
+                <a:solidFill>
+                  <a:schemeClr val="bg1"/>
+                </a:solidFill>
+              </a:rPr>
+              <a:t>Create a </a:t>
+            </a:r>
+            <a:r>
+              <a:rPr lang="en-AU" sz="2200" dirty="0">
+                <a:solidFill>
+                  <a:schemeClr val="bg1"/>
+                </a:solidFill>
+              </a:rPr>
+              <a:t>v</a:t>
+            </a:r>
+            <a:r>
+              <a:rPr lang="en-AU" sz="2200" dirty="0" smtClean="0">
+                <a:solidFill>
+                  <a:schemeClr val="bg1"/>
+                </a:solidFill>
+              </a:rPr>
+              <a:t>irtual simulation</a:t>
+            </a:r>
+            <a:endParaRPr lang="en-AU" sz="2200" dirty="0">
+              <a:solidFill>
+                <a:schemeClr val="bg1"/>
+              </a:solidFill>
+            </a:endParaRPr>
           </a:p>
           <a:p>
             <a:pPr lvl="1">
@@ -7520,12 +7933,28 @@
               <a:buChar char="§"/>
             </a:pPr>
             <a:r>
-              <a:rPr lang="en-AU" dirty="0">
-                <a:solidFill>
-                  <a:schemeClr val="bg1"/>
-                </a:solidFill>
-              </a:rPr>
-              <a:t> 3 different exercises to demonstrate different movements</a:t>
+              <a:rPr lang="en-AU" sz="2200" dirty="0" smtClean="0">
+                <a:solidFill>
+                  <a:schemeClr val="bg1"/>
+                </a:solidFill>
+              </a:rPr>
+              <a:t>Design and develop 3 </a:t>
+            </a:r>
+            <a:r>
+              <a:rPr lang="en-AU" sz="2200" dirty="0">
+                <a:solidFill>
+                  <a:schemeClr val="bg1"/>
+                </a:solidFill>
+              </a:rPr>
+              <a:t>different </a:t>
+            </a:r>
+            <a:r>
+              <a:rPr lang="en-AU" sz="2200" dirty="0" smtClean="0">
+                <a:solidFill>
+                  <a:schemeClr val="bg1"/>
+                </a:solidFill>
+              </a:rPr>
+              <a:t>tasks </a:t>
             </a:r>
           </a:p>
           <a:p>
@@ -7534,28 +7963,12 @@
               <a:buChar char="§"/>
             </a:pPr>
             <a:r>
-              <a:rPr lang="en-AU" dirty="0">
-                <a:solidFill>
-                  <a:schemeClr val="bg1"/>
-                </a:solidFill>
-              </a:rPr>
-              <a:t> Using </a:t>
-            </a:r>
-            <a:r>
-              <a:rPr lang="en-AU" dirty="0" smtClean="0">
-                <a:solidFill>
-                  <a:schemeClr val="bg1"/>
-                </a:solidFill>
-              </a:rPr>
-              <a:t>the </a:t>
-            </a:r>
-            <a:r>
-              <a:rPr lang="en-AU" dirty="0">
-                <a:solidFill>
-                  <a:schemeClr val="bg1"/>
-                </a:solidFill>
-              </a:rPr>
-              <a:t>given devices (explained next)</a:t>
+              <a:rPr lang="en-AU" sz="2200" dirty="0" smtClean="0">
+                <a:solidFill>
+                  <a:schemeClr val="bg1"/>
+                </a:solidFill>
+              </a:rPr>
+              <a:t>Utilize natural user interfaces devices</a:t>
             </a:r>
           </a:p>
           <a:p>
@@ -7564,12 +7977,20 @@
               <a:buChar char="§"/>
             </a:pPr>
             <a:r>
-              <a:rPr lang="en-AU" dirty="0">
-                <a:solidFill>
-                  <a:schemeClr val="bg1"/>
-                </a:solidFill>
-              </a:rPr>
-              <a:t> Sensitivity adjustor</a:t>
+              <a:rPr lang="en-AU" sz="2200" dirty="0" smtClean="0">
+                <a:solidFill>
+                  <a:schemeClr val="bg1"/>
+                </a:solidFill>
+              </a:rPr>
+              <a:t>Design and develop sensitivity </a:t>
+            </a:r>
+            <a:r>
+              <a:rPr lang="en-AU" sz="2200" dirty="0">
+                <a:solidFill>
+                  <a:schemeClr val="bg1"/>
+                </a:solidFill>
+              </a:rPr>
+              <a:t>adjustor</a:t>
             </a:r>
           </a:p>
           <a:p>
@@ -7578,12 +7999,46 @@
               <a:buChar char="§"/>
             </a:pPr>
             <a:r>
-              <a:rPr lang="en-AU" dirty="0">
-                <a:solidFill>
-                  <a:schemeClr val="bg1"/>
-                </a:solidFill>
-              </a:rPr>
-              <a:t> Profiling and database to keep track of progress</a:t>
+              <a:rPr lang="en-AU" sz="2200" dirty="0" smtClean="0">
+                <a:solidFill>
+                  <a:schemeClr val="bg1"/>
+                </a:solidFill>
+              </a:rPr>
+              <a:t>Design and develop to support profiling </a:t>
+            </a:r>
+            <a:r>
+              <a:rPr lang="en-AU" sz="2200" dirty="0">
+                <a:solidFill>
+                  <a:schemeClr val="bg1"/>
+                </a:solidFill>
+              </a:rPr>
+              <a:t>and database </a:t>
+            </a:r>
+            <a:endParaRPr lang="en-AU" sz="2200" dirty="0">
+              <a:solidFill>
+                <a:schemeClr val="bg1"/>
+              </a:solidFill>
+            </a:endParaRPr>
+          </a:p>
+          <a:p>
+            <a:pPr marL="457200" lvl="1" indent="0">
+              <a:buNone/>
+            </a:pPr>
+            <a:r>
+              <a:rPr lang="en-AU" sz="2200" dirty="0" smtClean="0">
+                <a:solidFill>
+                  <a:schemeClr val="bg1"/>
+                </a:solidFill>
+              </a:rPr>
+              <a:t>	to </a:t>
+            </a:r>
+            <a:r>
+              <a:rPr lang="en-AU" sz="2200" dirty="0">
+                <a:solidFill>
+                  <a:schemeClr val="bg1"/>
+                </a:solidFill>
+              </a:rPr>
+              <a:t>keep track of progress</a:t>
             </a:r>
           </a:p>
           <a:p>
@@ -7651,7 +8106,7 @@
                   <a:schemeClr val="bg1"/>
                 </a:solidFill>
               </a:rPr>
-              <a:t>The S</a:t>
+              <a:t>The </a:t>
             </a:r>
             <a:r>
               <a:rPr lang="en-AU" b="1" dirty="0" smtClean="0">
@@ -7659,7 +8114,7 @@
                   <a:schemeClr val="bg1"/>
                 </a:solidFill>
               </a:rPr>
-              <a:t>olution</a:t>
+              <a:t>Solutions</a:t>
             </a:r>
             <a:endParaRPr lang="en-AU" b="1" dirty="0">
               <a:solidFill>
@@ -7687,7 +8142,7 @@
         </p:spPr>
         <p:txBody>
           <a:bodyPr>
-            <a:normAutofit fontScale="85000" lnSpcReduction="20000"/>
+            <a:normAutofit fontScale="62500" lnSpcReduction="20000"/>
           </a:bodyPr>
           <a:lstStyle/>
           <a:p>
@@ -7700,7 +8155,7 @@
                   <a:schemeClr val="bg1"/>
                 </a:solidFill>
               </a:rPr>
-              <a:t>Virtual Simulation</a:t>
+              <a:t>The main system must have:</a:t>
             </a:r>
           </a:p>
           <a:p>
@@ -7713,119 +8168,166 @@
                   <a:schemeClr val="bg1"/>
                 </a:solidFill>
               </a:rPr>
-              <a:t>3 different exercises that require different movements</a:t>
-            </a:r>
-          </a:p>
-          <a:p>
-            <a:pPr marL="0" indent="0">
-              <a:buNone/>
-            </a:pPr>
-            <a:r>
-              <a:rPr lang="en-AU" dirty="0" smtClean="0">
-                <a:solidFill>
-                  <a:schemeClr val="bg1"/>
-                </a:solidFill>
-              </a:rPr>
-              <a:t>Devices (providing different accessibilities) used in conjunction with Oculus Rift</a:t>
-            </a:r>
-          </a:p>
-          <a:p>
-            <a:pPr lvl="1">
-              <a:buFont typeface="Wingdings" panose="05000000000000000000" pitchFamily="2" charset="2"/>
-              <a:buChar char="§"/>
-            </a:pPr>
-            <a:r>
-              <a:rPr lang="en-AU" dirty="0" smtClean="0">
-                <a:solidFill>
-                  <a:schemeClr val="bg1"/>
-                </a:solidFill>
-              </a:rPr>
-              <a:t>Keyboard </a:t>
-            </a:r>
-            <a:r>
-              <a:rPr lang="en-AU" dirty="0">
-                <a:solidFill>
-                  <a:schemeClr val="bg1"/>
-                </a:solidFill>
-              </a:rPr>
-              <a:t>and mouse</a:t>
-            </a:r>
-          </a:p>
-          <a:p>
-            <a:pPr lvl="1">
-              <a:buFont typeface="Wingdings" panose="05000000000000000000" pitchFamily="2" charset="2"/>
-              <a:buChar char="§"/>
-            </a:pPr>
-            <a:r>
-              <a:rPr lang="en-AU" dirty="0" smtClean="0">
-                <a:solidFill>
-                  <a:schemeClr val="bg1"/>
-                </a:solidFill>
-              </a:rPr>
-              <a:t>Razer </a:t>
-            </a:r>
-            <a:r>
-              <a:rPr lang="en-AU" dirty="0">
-                <a:solidFill>
-                  <a:schemeClr val="bg1"/>
-                </a:solidFill>
-              </a:rPr>
-              <a:t>Hydra</a:t>
-            </a:r>
-          </a:p>
-          <a:p>
-            <a:pPr lvl="1">
-              <a:buFont typeface="Wingdings" panose="05000000000000000000" pitchFamily="2" charset="2"/>
-              <a:buChar char="§"/>
-            </a:pPr>
-            <a:r>
-              <a:rPr lang="en-AU" dirty="0" err="1" smtClean="0">
-                <a:solidFill>
-                  <a:schemeClr val="bg1"/>
-                </a:solidFill>
-              </a:rPr>
-              <a:t>Kinect</a:t>
-            </a:r>
-            <a:endParaRPr lang="en-AU" dirty="0">
+              <a:t>Virtual environments</a:t>
+            </a:r>
+            <a:endParaRPr lang="en-AU" dirty="0" smtClean="0">
               <a:solidFill>
                 <a:schemeClr val="bg1"/>
               </a:solidFill>
             </a:endParaRPr>
           </a:p>
           <a:p>
+            <a:pPr marL="0" indent="0">
+              <a:buNone/>
+            </a:pPr>
+            <a:r>
+              <a:rPr lang="en-AU" dirty="0" smtClean="0">
+                <a:solidFill>
+                  <a:schemeClr val="bg1"/>
+                </a:solidFill>
+              </a:rPr>
+              <a:t>3 different </a:t>
+            </a:r>
+            <a:r>
+              <a:rPr lang="en-AU" dirty="0" smtClean="0">
+                <a:solidFill>
+                  <a:schemeClr val="bg1"/>
+                </a:solidFill>
+              </a:rPr>
+              <a:t>tasks that </a:t>
+            </a:r>
+            <a:r>
+              <a:rPr lang="en-AU" dirty="0" smtClean="0">
+                <a:solidFill>
+                  <a:schemeClr val="bg1"/>
+                </a:solidFill>
+              </a:rPr>
+              <a:t>require different </a:t>
+            </a:r>
+            <a:r>
+              <a:rPr lang="en-AU" dirty="0" smtClean="0">
+                <a:solidFill>
+                  <a:schemeClr val="bg1"/>
+                </a:solidFill>
+              </a:rPr>
+              <a:t>movements</a:t>
+            </a:r>
+          </a:p>
+          <a:p>
+            <a:pPr marL="742950" lvl="2" indent="-342900">
+              <a:buFont typeface="Wingdings" panose="05000000000000000000" pitchFamily="2" charset="2"/>
+              <a:buChar char="§"/>
+            </a:pPr>
+            <a:r>
+              <a:rPr lang="en-AU" sz="3200" dirty="0" smtClean="0">
+                <a:solidFill>
+                  <a:schemeClr val="bg1"/>
+                </a:solidFill>
+              </a:rPr>
+              <a:t>Object Manipulation</a:t>
+            </a:r>
+          </a:p>
+          <a:p>
+            <a:pPr marL="742950" lvl="2" indent="-342900">
+              <a:buFont typeface="Wingdings" panose="05000000000000000000" pitchFamily="2" charset="2"/>
+              <a:buChar char="§"/>
+            </a:pPr>
+            <a:r>
+              <a:rPr lang="en-AU" sz="3200" dirty="0" smtClean="0">
+                <a:solidFill>
+                  <a:schemeClr val="bg1"/>
+                </a:solidFill>
+              </a:rPr>
+              <a:t>Obstacle Avoidance</a:t>
+            </a:r>
+          </a:p>
+          <a:p>
+            <a:pPr marL="742950" lvl="2" indent="-342900">
+              <a:buFont typeface="Wingdings" panose="05000000000000000000" pitchFamily="2" charset="2"/>
+              <a:buChar char="§"/>
+            </a:pPr>
+            <a:r>
+              <a:rPr lang="en-AU" sz="3200" dirty="0" smtClean="0">
+                <a:solidFill>
+                  <a:schemeClr val="bg1"/>
+                </a:solidFill>
+              </a:rPr>
+              <a:t>Way Finding</a:t>
+            </a:r>
+            <a:endParaRPr lang="en-AU" sz="3200" dirty="0" smtClean="0">
+              <a:solidFill>
+                <a:schemeClr val="bg1"/>
+              </a:solidFill>
+            </a:endParaRPr>
+          </a:p>
+          <a:p>
+            <a:pPr marL="0" indent="0">
+              <a:buNone/>
+            </a:pPr>
+            <a:r>
+              <a:rPr lang="en-AU" dirty="0" smtClean="0">
+                <a:solidFill>
+                  <a:schemeClr val="bg1"/>
+                </a:solidFill>
+              </a:rPr>
+              <a:t>Natural user interfaces* devices </a:t>
+            </a:r>
+            <a:r>
+              <a:rPr lang="en-AU" dirty="0" smtClean="0">
+                <a:solidFill>
+                  <a:schemeClr val="bg1"/>
+                </a:solidFill>
+              </a:rPr>
+              <a:t>(providing different accessibilities) used in conjunction with Oculus </a:t>
+            </a:r>
+            <a:r>
+              <a:rPr lang="en-AU" dirty="0" smtClean="0">
+                <a:solidFill>
+                  <a:schemeClr val="bg1"/>
+                </a:solidFill>
+              </a:rPr>
+              <a:t>Rift (the main display)</a:t>
+            </a:r>
+            <a:endParaRPr lang="en-AU" dirty="0" smtClean="0">
+              <a:solidFill>
+                <a:schemeClr val="bg1"/>
+              </a:solidFill>
+            </a:endParaRPr>
+          </a:p>
+          <a:p>
             <a:pPr lvl="1">
               <a:buFont typeface="Wingdings" panose="05000000000000000000" pitchFamily="2" charset="2"/>
               <a:buChar char="§"/>
             </a:pPr>
             <a:r>
-              <a:rPr lang="en-AU" dirty="0" smtClean="0">
-                <a:solidFill>
-                  <a:schemeClr val="bg1"/>
-                </a:solidFill>
-              </a:rPr>
-              <a:t>Leap </a:t>
-            </a:r>
-            <a:r>
-              <a:rPr lang="en-AU" dirty="0">
-                <a:solidFill>
-                  <a:schemeClr val="bg1"/>
-                </a:solidFill>
-              </a:rPr>
-              <a:t>Motion</a:t>
-            </a:r>
-          </a:p>
-          <a:p>
-            <a:pPr marL="0" indent="0">
-              <a:buNone/>
-            </a:pPr>
-            <a:r>
-              <a:rPr lang="en-AU" dirty="0" smtClean="0">
-                <a:solidFill>
-                  <a:schemeClr val="bg1"/>
-                </a:solidFill>
-              </a:rPr>
-              <a:t>Sensitivity and other adjustable settings</a:t>
-            </a:r>
+              <a:rPr lang="en-AU" sz="3200" dirty="0" smtClean="0">
+                <a:solidFill>
+                  <a:schemeClr val="bg1"/>
+                </a:solidFill>
+              </a:rPr>
+              <a:t>Keyboard </a:t>
+            </a:r>
+            <a:r>
+              <a:rPr lang="en-AU" sz="3200" dirty="0">
+                <a:solidFill>
+                  <a:schemeClr val="bg1"/>
+                </a:solidFill>
+              </a:rPr>
+              <a:t>and </a:t>
+            </a:r>
+            <a:r>
+              <a:rPr lang="en-AU" sz="3200" dirty="0" smtClean="0">
+                <a:solidFill>
+                  <a:schemeClr val="bg1"/>
+                </a:solidFill>
+              </a:rPr>
+              <a:t>mouse* (control device)</a:t>
+            </a:r>
+            <a:endParaRPr lang="en-AU" sz="3200" dirty="0">
+              <a:solidFill>
+                <a:schemeClr val="bg1"/>
+              </a:solidFill>
+            </a:endParaRPr>
           </a:p>
           <a:p>
             <a:pPr lvl="1">
@@ -7833,14 +8335,90 @@
               <a:buChar char="§"/>
             </a:pPr>
             <a:r>
+              <a:rPr lang="en-AU" sz="3200" dirty="0" smtClean="0">
+                <a:solidFill>
+                  <a:schemeClr val="bg1"/>
+                </a:solidFill>
+              </a:rPr>
+              <a:t>Razer </a:t>
+            </a:r>
+            <a:r>
+              <a:rPr lang="en-AU" sz="3200" dirty="0">
+                <a:solidFill>
+                  <a:schemeClr val="bg1"/>
+                </a:solidFill>
+              </a:rPr>
+              <a:t>Hydra</a:t>
+            </a:r>
+          </a:p>
+          <a:p>
+            <a:pPr lvl="1">
+              <a:buFont typeface="Wingdings" panose="05000000000000000000" pitchFamily="2" charset="2"/>
+              <a:buChar char="§"/>
+            </a:pPr>
+            <a:r>
+              <a:rPr lang="en-AU" sz="3200" dirty="0" err="1" smtClean="0">
+                <a:solidFill>
+                  <a:schemeClr val="bg1"/>
+                </a:solidFill>
+              </a:rPr>
+              <a:t>Kinect</a:t>
+            </a:r>
+            <a:endParaRPr lang="en-AU" sz="3200" dirty="0">
+              <a:solidFill>
+                <a:schemeClr val="bg1"/>
+              </a:solidFill>
+            </a:endParaRPr>
+          </a:p>
+          <a:p>
+            <a:pPr lvl="1">
+              <a:buFont typeface="Wingdings" panose="05000000000000000000" pitchFamily="2" charset="2"/>
+              <a:buChar char="§"/>
+            </a:pPr>
+            <a:r>
+              <a:rPr lang="en-AU" sz="3200" dirty="0" smtClean="0">
+                <a:solidFill>
+                  <a:schemeClr val="bg1"/>
+                </a:solidFill>
+              </a:rPr>
+              <a:t>Leap </a:t>
+            </a:r>
+            <a:r>
+              <a:rPr lang="en-AU" sz="3200" dirty="0">
+                <a:solidFill>
+                  <a:schemeClr val="bg1"/>
+                </a:solidFill>
+              </a:rPr>
+              <a:t>Motion</a:t>
+            </a:r>
+          </a:p>
+          <a:p>
+            <a:pPr marL="0" indent="0">
+              <a:buNone/>
+            </a:pPr>
+            <a:r>
               <a:rPr lang="en-AU" dirty="0" smtClean="0">
                 <a:solidFill>
                   <a:schemeClr val="bg1"/>
                 </a:solidFill>
               </a:rPr>
+              <a:t>Sensitivity and other adjustable settings</a:t>
+            </a:r>
+          </a:p>
+          <a:p>
+            <a:pPr lvl="1">
+              <a:buFont typeface="Wingdings" panose="05000000000000000000" pitchFamily="2" charset="2"/>
+              <a:buChar char="§"/>
+            </a:pPr>
+            <a:r>
+              <a:rPr lang="en-AU" sz="3200" dirty="0" smtClean="0">
+                <a:solidFill>
+                  <a:schemeClr val="bg1"/>
+                </a:solidFill>
+              </a:rPr>
               <a:t>Provide incremental goals</a:t>
             </a:r>
-            <a:endParaRPr lang="en-AU" dirty="0">
+            <a:endParaRPr lang="en-AU" sz="3200" dirty="0">
               <a:solidFill>
                 <a:schemeClr val="bg1"/>
               </a:solidFill>
@@ -7988,13 +8566,13 @@
         </p:nvSpPr>
         <p:spPr>
           <a:xfrm>
-            <a:off x="246841" y="1196752"/>
+            <a:off x="251520" y="1412776"/>
             <a:ext cx="8496944" cy="2736304"/>
           </a:xfrm>
         </p:spPr>
         <p:txBody>
           <a:bodyPr>
-            <a:normAutofit lnSpcReduction="10000"/>
+            <a:normAutofit/>
           </a:bodyPr>
           <a:lstStyle/>
           <a:p>
@@ -8002,7 +8580,7 @@
               <a:buNone/>
             </a:pPr>
             <a:r>
-              <a:rPr lang="en-AU" dirty="0" smtClean="0">
+              <a:rPr lang="en-AU" sz="2000" dirty="0" smtClean="0">
                 <a:solidFill>
                   <a:schemeClr val="bg1"/>
                 </a:solidFill>
@@ -8015,7 +8593,7 @@
               <a:buNone/>
             </a:pPr>
             <a:r>
-              <a:rPr lang="en-AU" dirty="0" smtClean="0">
+              <a:rPr lang="en-AU" sz="2000" dirty="0" smtClean="0">
                 <a:solidFill>
                   <a:schemeClr val="bg1"/>
                 </a:solidFill>
@@ -8028,7 +8606,7 @@
               <a:buNone/>
             </a:pPr>
             <a:r>
-              <a:rPr lang="en-AU" dirty="0" smtClean="0">
+              <a:rPr lang="en-AU" sz="2000" dirty="0" smtClean="0">
                 <a:solidFill>
                   <a:schemeClr val="bg1"/>
                 </a:solidFill>
@@ -8042,7 +8620,7 @@
               <a:buChar char="§"/>
             </a:pPr>
             <a:r>
-              <a:rPr lang="en-AU" dirty="0" smtClean="0">
+              <a:rPr lang="en-AU" sz="2000" dirty="0" smtClean="0">
                 <a:solidFill>
                   <a:schemeClr val="bg1"/>
                 </a:solidFill>
@@ -8056,13 +8634,63 @@
               <a:buChar char="§"/>
             </a:pPr>
             <a:r>
-              <a:rPr lang="en-AU" dirty="0" smtClean="0">
-                <a:solidFill>
-                  <a:schemeClr val="bg1"/>
-                </a:solidFill>
-              </a:rPr>
-              <a:t>Facebook group</a:t>
-            </a:r>
+              <a:rPr lang="en-AU" sz="2000" dirty="0" smtClean="0">
+                <a:solidFill>
+                  <a:schemeClr val="bg1"/>
+                </a:solidFill>
+              </a:rPr>
+              <a:t>Facebook </a:t>
+            </a:r>
+            <a:r>
+              <a:rPr lang="en-AU" sz="2000" dirty="0" smtClean="0">
+                <a:solidFill>
+                  <a:schemeClr val="bg1"/>
+                </a:solidFill>
+              </a:rPr>
+              <a:t>group</a:t>
+            </a:r>
+          </a:p>
+          <a:p>
+            <a:pPr marL="0" indent="0">
+              <a:buNone/>
+            </a:pPr>
+            <a:r>
+              <a:rPr lang="en-AU" sz="2000" dirty="0">
+                <a:solidFill>
+                  <a:schemeClr val="bg1"/>
+                </a:solidFill>
+              </a:rPr>
+              <a:t>Source code control</a:t>
+            </a:r>
+          </a:p>
+          <a:p>
+            <a:pPr lvl="1">
+              <a:buFont typeface="Wingdings" panose="05000000000000000000" pitchFamily="2" charset="2"/>
+              <a:buChar char="§"/>
+            </a:pPr>
+            <a:r>
+              <a:rPr lang="en-AU" sz="2000" dirty="0" err="1">
+                <a:solidFill>
+                  <a:schemeClr val="bg1"/>
+                </a:solidFill>
+              </a:rPr>
+              <a:t>GitHub</a:t>
+            </a:r>
+            <a:endParaRPr lang="en-AU" sz="2000" dirty="0">
+              <a:solidFill>
+                <a:schemeClr val="bg1"/>
+              </a:solidFill>
+            </a:endParaRPr>
+          </a:p>
+          <a:p>
+            <a:pPr marL="0" indent="0">
+              <a:buNone/>
+            </a:pPr>
+            <a:endParaRPr lang="en-AU" sz="2400" dirty="0" smtClean="0">
+              <a:solidFill>
+                <a:schemeClr val="bg1"/>
+              </a:solidFill>
+            </a:endParaRPr>
           </a:p>
         </p:txBody>
       </p:sp>
@@ -8089,8 +8717,8 @@
         </p:blipFill>
         <p:spPr bwMode="auto">
           <a:xfrm>
-            <a:off x="1625904" y="3789040"/>
-            <a:ext cx="7518095" cy="3107480"/>
+            <a:off x="1974329" y="3894536"/>
+            <a:ext cx="7169669" cy="2963464"/>
           </a:xfrm>
           <a:prstGeom prst="rect">
             <a:avLst/>
@@ -8107,65 +8735,6 @@
           </a:extLst>
         </p:spPr>
       </p:pic>
-      <p:sp>
-        <p:nvSpPr>
-          <p:cNvPr id="5" name="TextBox 4"/>
-          <p:cNvSpPr txBox="1"/>
-          <p:nvPr/>
-        </p:nvSpPr>
-        <p:spPr>
-          <a:xfrm>
-            <a:off x="4495313" y="2276872"/>
-            <a:ext cx="4680520" cy="1354217"/>
-          </a:xfrm>
-          <a:prstGeom prst="rect">
-            <a:avLst/>
-          </a:prstGeom>
-          <a:noFill/>
-        </p:spPr>
-        <p:txBody>
-          <a:bodyPr wrap="square" rtlCol="0">
-            <a:spAutoFit/>
-          </a:bodyPr>
-          <a:lstStyle/>
-          <a:p>
-            <a:r>
-              <a:rPr lang="en-AU" sz="3200" dirty="0">
-                <a:solidFill>
-                  <a:schemeClr val="bg1"/>
-                </a:solidFill>
-              </a:rPr>
-              <a:t>Source code control</a:t>
-            </a:r>
-          </a:p>
-          <a:p>
-            <a:pPr lvl="1">
-              <a:buFont typeface="Wingdings" panose="05000000000000000000" pitchFamily="2" charset="2"/>
-              <a:buChar char="§"/>
-            </a:pPr>
-            <a:r>
-              <a:rPr lang="en-AU" sz="3200" dirty="0" err="1">
-                <a:solidFill>
-                  <a:schemeClr val="bg1"/>
-                </a:solidFill>
-              </a:rPr>
-              <a:t>GitHub</a:t>
-            </a:r>
-            <a:endParaRPr lang="en-AU" sz="3200" dirty="0">
-              <a:solidFill>
-                <a:schemeClr val="bg1"/>
-              </a:solidFill>
-            </a:endParaRPr>
-          </a:p>
-          <a:p>
-            <a:endParaRPr lang="en-AU" dirty="0">
-              <a:solidFill>
-                <a:schemeClr val="bg1"/>
-              </a:solidFill>
-            </a:endParaRPr>
-          </a:p>
-        </p:txBody>
-      </p:sp>
     </p:spTree>
     <p:extLst>
       <p:ext uri="{BB962C8B-B14F-4D97-AF65-F5344CB8AC3E}">
@@ -8224,7 +8793,15 @@
                   <a:schemeClr val="bg1"/>
                 </a:solidFill>
               </a:rPr>
-              <a:t>Project Management</a:t>
+              <a:t>Project </a:t>
+            </a:r>
+            <a:r>
+              <a:rPr lang="en-AU" b="1" dirty="0" smtClean="0">
+                <a:solidFill>
+                  <a:schemeClr val="bg1"/>
+                </a:solidFill>
+              </a:rPr>
+              <a:t>Management Team</a:t>
             </a:r>
             <a:endParaRPr lang="en-AU" b="1" dirty="0">
               <a:solidFill>
@@ -8244,16 +8821,23 @@
             <p:ph idx="1"/>
           </p:nvPr>
         </p:nvSpPr>
-        <p:spPr/>
-        <p:txBody>
-          <a:bodyPr/>
+        <p:spPr>
+          <a:xfrm>
+            <a:off x="1695496" y="1600200"/>
+            <a:ext cx="6991303" cy="5141168"/>
+          </a:xfrm>
+        </p:spPr>
+        <p:txBody>
+          <a:bodyPr>
+            <a:normAutofit/>
+          </a:bodyPr>
           <a:lstStyle/>
           <a:p>
             <a:pPr marL="0" indent="0">
               <a:buNone/>
             </a:pPr>
             <a:r>
-              <a:rPr lang="en-AU" dirty="0">
+              <a:rPr lang="en-AU" sz="2000" dirty="0">
                 <a:solidFill>
                   <a:schemeClr val="bg1"/>
                 </a:solidFill>
@@ -8261,14 +8845,43 @@
               <a:t>Ary Bizar – Level </a:t>
             </a:r>
             <a:r>
-              <a:rPr lang="en-AU" dirty="0" smtClean="0">
-                <a:solidFill>
-                  <a:schemeClr val="bg1"/>
-                </a:solidFill>
-              </a:rPr>
-              <a:t>designer, Asset creator</a:t>
-            </a:r>
-            <a:endParaRPr lang="en-AU" dirty="0">
+              <a:rPr lang="en-AU" sz="2000" dirty="0" smtClean="0">
+                <a:solidFill>
+                  <a:schemeClr val="bg1"/>
+                </a:solidFill>
+              </a:rPr>
+              <a:t>designer, </a:t>
+            </a:r>
+            <a:r>
+              <a:rPr lang="en-AU" sz="2000" dirty="0">
+                <a:solidFill>
+                  <a:schemeClr val="bg1"/>
+                </a:solidFill>
+              </a:rPr>
+              <a:t>Asset </a:t>
+            </a:r>
+            <a:r>
+              <a:rPr lang="en-AU" sz="2000" dirty="0" smtClean="0">
+                <a:solidFill>
+                  <a:schemeClr val="bg1"/>
+                </a:solidFill>
+              </a:rPr>
+              <a:t>creator, </a:t>
+            </a:r>
+            <a:r>
+              <a:rPr lang="en-AU" sz="2000" dirty="0" smtClean="0">
+                <a:solidFill>
+                  <a:schemeClr val="bg1"/>
+                </a:solidFill>
+              </a:rPr>
+              <a:t>Mouse &amp; keyboard development</a:t>
+            </a:r>
+          </a:p>
+          <a:p>
+            <a:pPr marL="0" indent="0">
+              <a:buNone/>
+            </a:pPr>
+            <a:endParaRPr lang="en-AU" sz="2000" dirty="0" smtClean="0">
               <a:solidFill>
                 <a:schemeClr val="bg1"/>
               </a:solidFill>
@@ -8278,31 +8891,7 @@
             <a:pPr marL="0" indent="0">
               <a:buNone/>
             </a:pPr>
-            <a:r>
-              <a:rPr lang="en-AU" dirty="0">
-                <a:solidFill>
-                  <a:schemeClr val="bg1"/>
-                </a:solidFill>
-              </a:rPr>
-              <a:t>Anopan Kandiah – </a:t>
-            </a:r>
-            <a:r>
-              <a:rPr lang="en-AU" dirty="0" err="1">
-                <a:solidFill>
-                  <a:schemeClr val="bg1"/>
-                </a:solidFill>
-              </a:rPr>
-              <a:t>Kinect</a:t>
-            </a:r>
-            <a:r>
-              <a:rPr lang="en-AU" dirty="0">
-                <a:solidFill>
-                  <a:schemeClr val="bg1"/>
-                </a:solidFill>
-              </a:rPr>
-              <a:t> development</a:t>
-            </a:r>
-            <a:endParaRPr lang="en-AU" sz="2400" dirty="0">
+            <a:endParaRPr lang="en-AU" sz="2000" dirty="0" smtClean="0">
               <a:solidFill>
                 <a:schemeClr val="bg1"/>
               </a:solidFill>
@@ -8313,22 +8902,43 @@
               <a:buNone/>
             </a:pPr>
             <a:r>
-              <a:rPr lang="en-AU" dirty="0">
-                <a:solidFill>
-                  <a:schemeClr val="bg1"/>
-                </a:solidFill>
-              </a:rPr>
-              <a:t>Hannah Klinac – Leap Motion </a:t>
-            </a:r>
-            <a:r>
-              <a:rPr lang="en-AU" dirty="0" smtClean="0">
-                <a:solidFill>
-                  <a:schemeClr val="bg1"/>
-                </a:solidFill>
-              </a:rPr>
-              <a:t>development, 			Project Manager</a:t>
-            </a:r>
-            <a:endParaRPr lang="en-AU" sz="2400" dirty="0">
+              <a:rPr lang="en-AU" sz="2000" dirty="0" smtClean="0">
+                <a:solidFill>
+                  <a:schemeClr val="bg1"/>
+                </a:solidFill>
+              </a:rPr>
+              <a:t>Anopan </a:t>
+            </a:r>
+            <a:r>
+              <a:rPr lang="en-AU" sz="2000" dirty="0">
+                <a:solidFill>
+                  <a:schemeClr val="bg1"/>
+                </a:solidFill>
+              </a:rPr>
+              <a:t>Kandiah – </a:t>
+            </a:r>
+            <a:r>
+              <a:rPr lang="en-AU" sz="2000" dirty="0" err="1">
+                <a:solidFill>
+                  <a:schemeClr val="bg1"/>
+                </a:solidFill>
+              </a:rPr>
+              <a:t>Kinect</a:t>
+            </a:r>
+            <a:r>
+              <a:rPr lang="en-AU" sz="2000" dirty="0">
+                <a:solidFill>
+                  <a:schemeClr val="bg1"/>
+                </a:solidFill>
+              </a:rPr>
+              <a:t> development</a:t>
+            </a:r>
+          </a:p>
+          <a:p>
+            <a:pPr marL="0" indent="0">
+              <a:buNone/>
+            </a:pPr>
+            <a:endParaRPr lang="en-AU" sz="2000" dirty="0" smtClean="0">
               <a:solidFill>
                 <a:schemeClr val="bg1"/>
               </a:solidFill>
@@ -8338,31 +8948,7 @@
             <a:pPr marL="0" indent="0">
               <a:buNone/>
             </a:pPr>
-            <a:r>
-              <a:rPr lang="en-AU" dirty="0">
-                <a:solidFill>
-                  <a:schemeClr val="bg1"/>
-                </a:solidFill>
-              </a:rPr>
-              <a:t>Alex Mlodawski – </a:t>
-            </a:r>
-            <a:r>
-              <a:rPr lang="en-AU" dirty="0" err="1">
-                <a:solidFill>
-                  <a:schemeClr val="bg1"/>
-                </a:solidFill>
-              </a:rPr>
-              <a:t>Kinect</a:t>
-            </a:r>
-            <a:r>
-              <a:rPr lang="en-AU" dirty="0">
-                <a:solidFill>
-                  <a:schemeClr val="bg1"/>
-                </a:solidFill>
-              </a:rPr>
-              <a:t> development</a:t>
-            </a:r>
-            <a:endParaRPr lang="en-AU" sz="2400" dirty="0">
+            <a:endParaRPr lang="en-AU" sz="2000" dirty="0" smtClean="0">
               <a:solidFill>
                 <a:schemeClr val="bg1"/>
               </a:solidFill>
@@ -8373,22 +8959,358 @@
               <a:buNone/>
             </a:pPr>
             <a:r>
-              <a:rPr lang="en-AU" dirty="0">
-                <a:solidFill>
-                  <a:schemeClr val="bg1"/>
-                </a:solidFill>
-              </a:rPr>
-              <a:t>Bryan Yu – Razer Hydra development, database</a:t>
-            </a:r>
+              <a:rPr lang="en-AU" sz="2000" dirty="0" smtClean="0">
+                <a:solidFill>
+                  <a:schemeClr val="bg1"/>
+                </a:solidFill>
+              </a:rPr>
+              <a:t>Hannah </a:t>
+            </a:r>
+            <a:r>
+              <a:rPr lang="en-AU" sz="2000" dirty="0">
+                <a:solidFill>
+                  <a:schemeClr val="bg1"/>
+                </a:solidFill>
+              </a:rPr>
+              <a:t>Klinac – Leap Motion </a:t>
+            </a:r>
+            <a:r>
+              <a:rPr lang="en-AU" sz="2000" dirty="0" smtClean="0">
+                <a:solidFill>
+                  <a:schemeClr val="bg1"/>
+                </a:solidFill>
+              </a:rPr>
+              <a:t>development, 	</a:t>
+            </a:r>
+            <a:r>
+              <a:rPr lang="en-AU" sz="2000" dirty="0" smtClean="0">
+                <a:solidFill>
+                  <a:schemeClr val="bg1"/>
+                </a:solidFill>
+              </a:rPr>
+              <a:t>Project </a:t>
+            </a:r>
+            <a:r>
+              <a:rPr lang="en-AU" sz="2000" dirty="0" smtClean="0">
+                <a:solidFill>
+                  <a:schemeClr val="bg1"/>
+                </a:solidFill>
+              </a:rPr>
+              <a:t>Manager</a:t>
+            </a:r>
+            <a:endParaRPr lang="en-AU" sz="2000" dirty="0">
+              <a:solidFill>
+                <a:schemeClr val="bg1"/>
+              </a:solidFill>
+            </a:endParaRPr>
           </a:p>
           <a:p>
             <a:pPr marL="0" indent="0">
               <a:buNone/>
             </a:pPr>
+            <a:endParaRPr lang="en-AU" sz="2000" dirty="0" smtClean="0">
+              <a:solidFill>
+                <a:schemeClr val="bg1"/>
+              </a:solidFill>
+            </a:endParaRPr>
+          </a:p>
+          <a:p>
+            <a:pPr marL="0" indent="0">
+              <a:buNone/>
+            </a:pPr>
+            <a:endParaRPr lang="en-AU" sz="2000" dirty="0" smtClean="0">
+              <a:solidFill>
+                <a:schemeClr val="bg1"/>
+              </a:solidFill>
+            </a:endParaRPr>
+          </a:p>
+          <a:p>
+            <a:pPr marL="0" indent="0">
+              <a:buNone/>
+            </a:pPr>
+            <a:r>
+              <a:rPr lang="en-AU" sz="2000" dirty="0" smtClean="0">
+                <a:solidFill>
+                  <a:schemeClr val="bg1"/>
+                </a:solidFill>
+              </a:rPr>
+              <a:t>Alex </a:t>
+            </a:r>
+            <a:r>
+              <a:rPr lang="en-AU" sz="2000" dirty="0">
+                <a:solidFill>
+                  <a:schemeClr val="bg1"/>
+                </a:solidFill>
+              </a:rPr>
+              <a:t>Mlodawski – </a:t>
+            </a:r>
+            <a:r>
+              <a:rPr lang="en-AU" sz="2000" dirty="0" err="1">
+                <a:solidFill>
+                  <a:schemeClr val="bg1"/>
+                </a:solidFill>
+              </a:rPr>
+              <a:t>Kinect</a:t>
+            </a:r>
+            <a:r>
+              <a:rPr lang="en-AU" sz="2000" dirty="0">
+                <a:solidFill>
+                  <a:schemeClr val="bg1"/>
+                </a:solidFill>
+              </a:rPr>
+              <a:t> development</a:t>
+            </a:r>
+          </a:p>
+          <a:p>
+            <a:pPr marL="0" indent="0">
+              <a:buNone/>
+            </a:pPr>
+            <a:endParaRPr lang="en-AU" sz="2000" dirty="0" smtClean="0">
+              <a:solidFill>
+                <a:schemeClr val="bg1"/>
+              </a:solidFill>
+            </a:endParaRPr>
+          </a:p>
+          <a:p>
+            <a:pPr marL="0" indent="0">
+              <a:buNone/>
+            </a:pPr>
+            <a:endParaRPr lang="en-AU" sz="2000" dirty="0" smtClean="0">
+              <a:solidFill>
+                <a:schemeClr val="bg1"/>
+              </a:solidFill>
+            </a:endParaRPr>
+          </a:p>
+          <a:p>
+            <a:pPr marL="0" indent="0">
+              <a:buNone/>
+            </a:pPr>
+            <a:r>
+              <a:rPr lang="en-AU" sz="2000" dirty="0" smtClean="0">
+                <a:solidFill>
+                  <a:schemeClr val="bg1"/>
+                </a:solidFill>
+              </a:rPr>
+              <a:t>Bryan </a:t>
+            </a:r>
+            <a:r>
+              <a:rPr lang="en-AU" sz="2000" dirty="0">
+                <a:solidFill>
+                  <a:schemeClr val="bg1"/>
+                </a:solidFill>
+              </a:rPr>
+              <a:t>Yu – Razer Hydra development, </a:t>
+            </a:r>
+            <a:r>
+              <a:rPr lang="en-AU" sz="2000" dirty="0" smtClean="0">
+                <a:solidFill>
+                  <a:schemeClr val="bg1"/>
+                </a:solidFill>
+              </a:rPr>
+              <a:t>Profilin</a:t>
+            </a:r>
+            <a:r>
+              <a:rPr lang="en-AU" sz="2000" dirty="0" smtClean="0">
+                <a:solidFill>
+                  <a:schemeClr val="bg1"/>
+                </a:solidFill>
+              </a:rPr>
+              <a:t>g and </a:t>
+            </a:r>
+            <a:r>
+              <a:rPr lang="en-AU" sz="2000" dirty="0" smtClean="0">
+                <a:solidFill>
+                  <a:schemeClr val="bg1"/>
+                </a:solidFill>
+              </a:rPr>
+              <a:t>Database</a:t>
+            </a:r>
+            <a:endParaRPr lang="en-AU" sz="2000" dirty="0">
+              <a:solidFill>
+                <a:schemeClr val="bg1"/>
+              </a:solidFill>
+            </a:endParaRPr>
+          </a:p>
+          <a:p>
+            <a:pPr marL="0" indent="0">
+              <a:buNone/>
+            </a:pPr>
             <a:endParaRPr lang="en-AU" dirty="0"/>
           </a:p>
         </p:txBody>
       </p:sp>
+      <p:pic>
+        <p:nvPicPr>
+          <p:cNvPr id="7" name="Picture 6"/>
+          <p:cNvPicPr>
+            <a:picLocks noChangeAspect="1"/>
+          </p:cNvPicPr>
+          <p:nvPr/>
+        </p:nvPicPr>
+        <p:blipFill>
+          <a:blip r:embed="rId3">
+            <a:extLst>
+              <a:ext uri="{28A0092B-C50C-407E-A947-70E740481C1C}">
+                <a14:useLocalDpi xmlns:a14="http://schemas.microsoft.com/office/drawing/2010/main" val="0"/>
+              </a:ext>
+            </a:extLst>
+          </a:blip>
+          <a:stretch>
+            <a:fillRect/>
+          </a:stretch>
+        </p:blipFill>
+        <p:spPr>
+          <a:xfrm>
+            <a:off x="486092" y="4797152"/>
+            <a:ext cx="1039376" cy="930217"/>
+          </a:xfrm>
+          <a:prstGeom prst="rect">
+            <a:avLst/>
+          </a:prstGeom>
+        </p:spPr>
+      </p:pic>
+      <p:pic>
+        <p:nvPicPr>
+          <p:cNvPr id="8" name="Picture 7"/>
+          <p:cNvPicPr>
+            <a:picLocks noChangeAspect="1"/>
+          </p:cNvPicPr>
+          <p:nvPr/>
+        </p:nvPicPr>
+        <p:blipFill>
+          <a:blip r:embed="rId4">
+            <a:extLst>
+              <a:ext uri="{28A0092B-C50C-407E-A947-70E740481C1C}">
+                <a14:useLocalDpi xmlns:a14="http://schemas.microsoft.com/office/drawing/2010/main" val="0"/>
+              </a:ext>
+            </a:extLst>
+          </a:blip>
+          <a:stretch>
+            <a:fillRect/>
+          </a:stretch>
+        </p:blipFill>
+        <p:spPr>
+          <a:xfrm>
+            <a:off x="459496" y="2674756"/>
+            <a:ext cx="1092570" cy="930217"/>
+          </a:xfrm>
+          <a:prstGeom prst="rect">
+            <a:avLst/>
+          </a:prstGeom>
+        </p:spPr>
+      </p:pic>
+      <p:pic>
+        <p:nvPicPr>
+          <p:cNvPr id="9" name="Picture 8"/>
+          <p:cNvPicPr>
+            <a:picLocks noChangeAspect="1"/>
+          </p:cNvPicPr>
+          <p:nvPr/>
+        </p:nvPicPr>
+        <p:blipFill>
+          <a:blip r:embed="rId5" cstate="print">
+            <a:extLst>
+              <a:ext uri="{28A0092B-C50C-407E-A947-70E740481C1C}">
+                <a14:useLocalDpi xmlns:a14="http://schemas.microsoft.com/office/drawing/2010/main" val="0"/>
+              </a:ext>
+            </a:extLst>
+          </a:blip>
+          <a:stretch>
+            <a:fillRect/>
+          </a:stretch>
+        </p:blipFill>
+        <p:spPr>
+          <a:xfrm>
+            <a:off x="539552" y="3717032"/>
+            <a:ext cx="932459" cy="930217"/>
+          </a:xfrm>
+          <a:prstGeom prst="rect">
+            <a:avLst/>
+          </a:prstGeom>
+        </p:spPr>
+      </p:pic>
+      <p:pic>
+        <p:nvPicPr>
+          <p:cNvPr id="3074" name="Picture 2" descr="C:\Users\Hannah\Desktop\ICT313 Project\setup\Documents\Screenshots\Ary_000000000000001.png"/>
+          <p:cNvPicPr>
+            <a:picLocks noChangeAspect="1" noChangeArrowheads="1"/>
+          </p:cNvPicPr>
+          <p:nvPr/>
+        </p:nvPicPr>
+        <p:blipFill>
+          <a:blip r:embed="rId6" cstate="print">
+            <a:extLst>
+              <a:ext uri="{28A0092B-C50C-407E-A947-70E740481C1C}">
+                <a14:useLocalDpi xmlns:a14="http://schemas.microsoft.com/office/drawing/2010/main" val="0"/>
+              </a:ext>
+            </a:extLst>
+          </a:blip>
+          <a:srcRect/>
+          <a:stretch>
+            <a:fillRect/>
+          </a:stretch>
+        </p:blipFill>
+        <p:spPr bwMode="auto">
+          <a:xfrm>
+            <a:off x="539551" y="1556792"/>
+            <a:ext cx="932459" cy="932459"/>
+          </a:xfrm>
+          <a:prstGeom prst="rect">
+            <a:avLst/>
+          </a:prstGeom>
+          <a:noFill/>
+          <a:extLst>
+            <a:ext uri="{909E8E84-426E-40DD-AFC4-6F175D3DCCD1}">
+              <a14:hiddenFill xmlns:a14="http://schemas.microsoft.com/office/drawing/2010/main">
+                <a:solidFill>
+                  <a:srgbClr val="FFFFFF"/>
+                </a:solidFill>
+              </a14:hiddenFill>
+            </a:ext>
+          </a:extLst>
+        </p:spPr>
+      </p:pic>
+      <p:pic>
+        <p:nvPicPr>
+          <p:cNvPr id="3075" name="Picture 3" descr="C:\Users\Hannah\Desktop\ICT313 Project\setup\Documents\Screenshots\Bryan_mugshot.png"/>
+          <p:cNvPicPr>
+            <a:picLocks noChangeAspect="1" noChangeArrowheads="1"/>
+          </p:cNvPicPr>
+          <p:nvPr/>
+        </p:nvPicPr>
+        <p:blipFill>
+          <a:blip r:embed="rId7">
+            <a:extLst>
+              <a:ext uri="{28A0092B-C50C-407E-A947-70E740481C1C}">
+                <a14:useLocalDpi xmlns:a14="http://schemas.microsoft.com/office/drawing/2010/main" val="0"/>
+              </a:ext>
+            </a:extLst>
+          </a:blip>
+          <a:srcRect/>
+          <a:stretch>
+            <a:fillRect/>
+          </a:stretch>
+        </p:blipFill>
+        <p:spPr bwMode="auto">
+          <a:xfrm>
+            <a:off x="543382" y="5925541"/>
+            <a:ext cx="932459" cy="932459"/>
+          </a:xfrm>
+          <a:prstGeom prst="rect">
+            <a:avLst/>
+          </a:prstGeom>
+          <a:noFill/>
+          <a:extLst>
+            <a:ext uri="{909E8E84-426E-40DD-AFC4-6F175D3DCCD1}">
+              <a14:hiddenFill xmlns:a14="http://schemas.microsoft.com/office/drawing/2010/main">
+                <a:solidFill>
+                  <a:srgbClr val="FFFFFF"/>
+                </a:solidFill>
+              </a14:hiddenFill>
+            </a:ext>
+          </a:extLst>
+        </p:spPr>
+      </p:pic>
     </p:spTree>
     <p:extLst>
       <p:ext uri="{BB962C8B-B14F-4D97-AF65-F5344CB8AC3E}">
@@ -8488,7 +9410,23 @@
                   <a:schemeClr val="bg1"/>
                 </a:solidFill>
               </a:rPr>
-              <a:t>Main system developed in Unity and coded using C#</a:t>
+              <a:t>Main system </a:t>
+            </a:r>
+            <a:r>
+              <a:rPr lang="en-AU" dirty="0" smtClean="0">
+                <a:solidFill>
+                  <a:schemeClr val="bg1"/>
+                </a:solidFill>
+              </a:rPr>
+              <a:t>was developed using Unity </a:t>
+            </a:r>
+            <a:r>
+              <a:rPr lang="en-AU" dirty="0" smtClean="0">
+                <a:solidFill>
+                  <a:schemeClr val="bg1"/>
+                </a:solidFill>
+              </a:rPr>
+              <a:t>and coded using C#</a:t>
             </a:r>
           </a:p>
           <a:p>

</xml_diff>